<commit_message>
Added text to new poster
</commit_message>
<xml_diff>
--- a/Poster/Poster_herwerking.pptx
+++ b/Poster/Poster_herwerking.pptx
@@ -4900,6 +4900,933 @@
           </a:prstGeom>
         </p:spPr>
       </p:pic>
+      <p:sp>
+        <p:nvSpPr>
+          <p:cNvPr id="2" name="Tekstvak 1"/>
+          <p:cNvSpPr txBox="1"/>
+          <p:nvPr/>
+        </p:nvSpPr>
+        <p:spPr>
+          <a:xfrm>
+            <a:off x="1724984" y="4426857"/>
+            <a:ext cx="12115800" cy="10033516"/>
+          </a:xfrm>
+          <a:prstGeom prst="rect">
+            <a:avLst/>
+          </a:prstGeom>
+          <a:noFill/>
+        </p:spPr>
+        <p:txBody>
+          <a:bodyPr wrap="square" rtlCol="0">
+            <a:spAutoFit/>
+          </a:bodyPr>
+          <a:lstStyle/>
+          <a:p>
+            <a:endParaRPr lang="nl-NL" dirty="0" smtClean="0">
+              <a:latin typeface="Avenir Next" charset="0"/>
+              <a:ea typeface="Avenir Next" charset="0"/>
+              <a:cs typeface="Avenir Next" charset="0"/>
+            </a:endParaRPr>
+          </a:p>
+          <a:p>
+            <a:r>
+              <a:rPr lang="nl-NL" sz="4200" b="1" dirty="0" smtClean="0">
+                <a:latin typeface="Avenir Next" charset="0"/>
+                <a:ea typeface="Avenir Next" charset="0"/>
+                <a:cs typeface="Avenir Next" charset="0"/>
+              </a:rPr>
+              <a:t>Introductie</a:t>
+            </a:r>
+          </a:p>
+          <a:p>
+            <a:pPr algn="just"/>
+            <a:r>
+              <a:rPr lang="nl-NL" sz="3600" dirty="0" smtClean="0">
+                <a:latin typeface="Avenir Next" charset="0"/>
+                <a:ea typeface="Avenir Next" charset="0"/>
+                <a:cs typeface="Avenir Next" charset="0"/>
+              </a:rPr>
+              <a:t>Sorteernetwerken zorgen voor een klassiek formeel model voor de 	presentatie van enkele sorteeralgoritmen. Door onderzoek naar deze sorteernetwerpen kunnen mogelijke inzichten ontstaan over sorteerproblemen. Zo hebben </a:t>
+            </a:r>
+            <a:r>
+              <a:rPr lang="nl-NL" sz="3600" dirty="0" err="1" smtClean="0">
+                <a:latin typeface="Avenir Next" charset="0"/>
+                <a:ea typeface="Avenir Next" charset="0"/>
+                <a:cs typeface="Avenir Next" charset="0"/>
+              </a:rPr>
+              <a:t>Codish</a:t>
+            </a:r>
+            <a:r>
+              <a:rPr lang="nl-NL" sz="3600" dirty="0" smtClean="0">
+                <a:latin typeface="Avenir Next" charset="0"/>
+                <a:ea typeface="Avenir Next" charset="0"/>
+                <a:cs typeface="Avenir Next" charset="0"/>
+              </a:rPr>
+              <a:t> et al. [1] aangetoond, via sorteernetwerken, dat het sorteren van 9 elementen een minimum van 25 vergelijkingen (</a:t>
+            </a:r>
+            <a:r>
+              <a:rPr lang="nl-NL" sz="3600" dirty="0" err="1" smtClean="0">
+                <a:latin typeface="Avenir Next" charset="0"/>
+                <a:ea typeface="Avenir Next" charset="0"/>
+                <a:cs typeface="Avenir Next" charset="0"/>
+              </a:rPr>
+              <a:t>comparatoren</a:t>
+            </a:r>
+            <a:r>
+              <a:rPr lang="nl-NL" sz="3600" dirty="0" smtClean="0">
+                <a:latin typeface="Avenir Next" charset="0"/>
+                <a:ea typeface="Avenir Next" charset="0"/>
+                <a:cs typeface="Avenir Next" charset="0"/>
+              </a:rPr>
+              <a:t>) vereist. Dit onderzoek 	bouwt hierop verder.</a:t>
+            </a:r>
+          </a:p>
+          <a:p>
+            <a:pPr algn="just"/>
+            <a:r>
+              <a:rPr lang="nl-NL" sz="3600" dirty="0" smtClean="0">
+                <a:latin typeface="Avenir Next" charset="0"/>
+                <a:ea typeface="Avenir Next" charset="0"/>
+                <a:cs typeface="Avenir Next" charset="0"/>
+              </a:rPr>
+              <a:t>Het doel bestaat erin</a:t>
+            </a:r>
+          </a:p>
+          <a:p>
+            <a:pPr marL="571500" indent="-571500" algn="just">
+              <a:buFont typeface="Arial" charset="0"/>
+              <a:buChar char="•"/>
+            </a:pPr>
+            <a:r>
+              <a:rPr lang="nl-NL" sz="3600" dirty="0">
+                <a:latin typeface="Avenir Next" charset="0"/>
+                <a:ea typeface="Avenir Next" charset="0"/>
+                <a:cs typeface="Avenir Next" charset="0"/>
+              </a:rPr>
+              <a:t>d</a:t>
+            </a:r>
+            <a:r>
+              <a:rPr lang="nl-NL" sz="3600" dirty="0" smtClean="0">
+                <a:latin typeface="Avenir Next" charset="0"/>
+                <a:ea typeface="Avenir Next" charset="0"/>
+                <a:cs typeface="Avenir Next" charset="0"/>
+              </a:rPr>
+              <a:t>e resultaten van </a:t>
+            </a:r>
+            <a:r>
+              <a:rPr lang="nl-NL" sz="3600" dirty="0" err="1" smtClean="0">
+                <a:latin typeface="Avenir Next" charset="0"/>
+                <a:ea typeface="Avenir Next" charset="0"/>
+                <a:cs typeface="Avenir Next" charset="0"/>
+              </a:rPr>
+              <a:t>Codish</a:t>
+            </a:r>
+            <a:r>
+              <a:rPr lang="nl-NL" sz="3600" dirty="0" smtClean="0">
+                <a:latin typeface="Avenir Next" charset="0"/>
+                <a:ea typeface="Avenir Next" charset="0"/>
+                <a:cs typeface="Avenir Next" charset="0"/>
+              </a:rPr>
+              <a:t> et al. [1] voor een sorteernetwerk van 9 kanalen en 25 </a:t>
+            </a:r>
+            <a:r>
+              <a:rPr lang="nl-NL" sz="3600" dirty="0" err="1" smtClean="0">
+                <a:latin typeface="Avenir Next" charset="0"/>
+                <a:ea typeface="Avenir Next" charset="0"/>
+                <a:cs typeface="Avenir Next" charset="0"/>
+              </a:rPr>
+              <a:t>comparatoren</a:t>
+            </a:r>
+            <a:r>
+              <a:rPr lang="nl-NL" sz="3600" dirty="0" smtClean="0">
+                <a:latin typeface="Avenir Next" charset="0"/>
+                <a:ea typeface="Avenir Next" charset="0"/>
+                <a:cs typeface="Avenir Next" charset="0"/>
+              </a:rPr>
+              <a:t> te reproduceren.</a:t>
+            </a:r>
+          </a:p>
+          <a:p>
+            <a:pPr marL="571500" indent="-571500" algn="just">
+              <a:buFont typeface="Arial" charset="0"/>
+              <a:buChar char="•"/>
+            </a:pPr>
+            <a:r>
+              <a:rPr lang="nl-NL" sz="3600" dirty="0">
+                <a:latin typeface="Avenir Next" charset="0"/>
+                <a:ea typeface="Avenir Next" charset="0"/>
+                <a:cs typeface="Avenir Next" charset="0"/>
+              </a:rPr>
+              <a:t>d</a:t>
+            </a:r>
+            <a:r>
+              <a:rPr lang="nl-NL" sz="3600" dirty="0" smtClean="0">
+                <a:latin typeface="Avenir Next" charset="0"/>
+                <a:ea typeface="Avenir Next" charset="0"/>
+                <a:cs typeface="Avenir Next" charset="0"/>
+              </a:rPr>
+              <a:t>e methode te verbeteren om een sorteernetwerk voor 11 kanalen te bekomen met optimale grootte.</a:t>
+            </a:r>
+          </a:p>
+          <a:p>
+            <a:pPr marL="571500" indent="-571500" algn="just">
+              <a:buFont typeface="Arial" charset="0"/>
+              <a:buChar char="•"/>
+            </a:pPr>
+            <a:endParaRPr lang="nl-NL" sz="3600" dirty="0">
+              <a:latin typeface="Avenir Next" charset="0"/>
+              <a:ea typeface="Avenir Next" charset="0"/>
+              <a:cs typeface="Avenir Next" charset="0"/>
+            </a:endParaRPr>
+          </a:p>
+        </p:txBody>
+      </p:sp>
+      <p:sp>
+        <p:nvSpPr>
+          <p:cNvPr id="19" name="Tekstvak 18"/>
+          <p:cNvSpPr txBox="1"/>
+          <p:nvPr/>
+        </p:nvSpPr>
+        <p:spPr>
+          <a:xfrm>
+            <a:off x="16167868" y="4426857"/>
+            <a:ext cx="12115800" cy="4493538"/>
+          </a:xfrm>
+          <a:prstGeom prst="rect">
+            <a:avLst/>
+          </a:prstGeom>
+          <a:noFill/>
+        </p:spPr>
+        <p:txBody>
+          <a:bodyPr wrap="square" rtlCol="0">
+            <a:spAutoFit/>
+          </a:bodyPr>
+          <a:lstStyle/>
+          <a:p>
+            <a:endParaRPr lang="nl-NL" dirty="0" smtClean="0">
+              <a:latin typeface="Avenir Next" charset="0"/>
+              <a:ea typeface="Avenir Next" charset="0"/>
+              <a:cs typeface="Avenir Next" charset="0"/>
+            </a:endParaRPr>
+          </a:p>
+          <a:p>
+            <a:r>
+              <a:rPr lang="nl-NL" sz="4200" b="1" dirty="0" smtClean="0">
+                <a:latin typeface="Avenir Next" charset="0"/>
+                <a:ea typeface="Avenir Next" charset="0"/>
+                <a:cs typeface="Avenir Next" charset="0"/>
+              </a:rPr>
+              <a:t>Achtergrondinformatie</a:t>
+            </a:r>
+          </a:p>
+          <a:p>
+            <a:pPr algn="just"/>
+            <a:r>
+              <a:rPr lang="nl-NL" sz="3600" dirty="0" smtClean="0">
+                <a:latin typeface="Avenir Next" charset="0"/>
+                <a:ea typeface="Avenir Next" charset="0"/>
+                <a:cs typeface="Avenir Next" charset="0"/>
+              </a:rPr>
+              <a:t>Een </a:t>
+            </a:r>
+            <a:r>
+              <a:rPr lang="nl-NL" sz="3600" dirty="0" err="1" smtClean="0">
+                <a:latin typeface="Avenir Next" charset="0"/>
+                <a:ea typeface="Avenir Next" charset="0"/>
+                <a:cs typeface="Avenir Next" charset="0"/>
+              </a:rPr>
+              <a:t>comparator</a:t>
+            </a:r>
+            <a:r>
+              <a:rPr lang="nl-NL" sz="3600" dirty="0" smtClean="0">
+                <a:latin typeface="Avenir Next" charset="0"/>
+                <a:ea typeface="Avenir Next" charset="0"/>
+                <a:cs typeface="Avenir Next" charset="0"/>
+              </a:rPr>
+              <a:t> netwerk is een netwerk dat gegeven een input een partieel gesorteerde permutatie van deze input terug geeft.</a:t>
+            </a:r>
+          </a:p>
+          <a:p>
+            <a:pPr marL="571500" indent="-571500" algn="just">
+              <a:buFont typeface="Arial" charset="0"/>
+              <a:buChar char="•"/>
+            </a:pPr>
+            <a:r>
+              <a:rPr lang="nl-NL" sz="3600" dirty="0">
+                <a:latin typeface="Avenir Next" charset="0"/>
+                <a:ea typeface="Avenir Next" charset="0"/>
+                <a:cs typeface="Avenir Next" charset="0"/>
+              </a:rPr>
+              <a:t>n</a:t>
+            </a:r>
+            <a:r>
+              <a:rPr lang="nl-NL" sz="3600" dirty="0" smtClean="0">
+                <a:latin typeface="Avenir Next" charset="0"/>
+                <a:ea typeface="Avenir Next" charset="0"/>
+                <a:cs typeface="Avenir Next" charset="0"/>
+              </a:rPr>
+              <a:t> kanalen</a:t>
+            </a:r>
+          </a:p>
+          <a:p>
+            <a:pPr marL="571500" indent="-571500" algn="just">
+              <a:buFont typeface="Arial" charset="0"/>
+              <a:buChar char="•"/>
+            </a:pPr>
+            <a:r>
+              <a:rPr lang="nl-NL" sz="3600" dirty="0">
+                <a:latin typeface="Avenir Next" charset="0"/>
+                <a:ea typeface="Avenir Next" charset="0"/>
+                <a:cs typeface="Avenir Next" charset="0"/>
+              </a:rPr>
+              <a:t>k</a:t>
+            </a:r>
+            <a:r>
+              <a:rPr lang="nl-NL" sz="3600" dirty="0" smtClean="0">
+                <a:latin typeface="Avenir Next" charset="0"/>
+                <a:ea typeface="Avenir Next" charset="0"/>
+                <a:cs typeface="Avenir Next" charset="0"/>
+              </a:rPr>
+              <a:t> </a:t>
+            </a:r>
+            <a:r>
+              <a:rPr lang="nl-NL" sz="3600" dirty="0" err="1" smtClean="0">
+                <a:latin typeface="Avenir Next" charset="0"/>
+                <a:ea typeface="Avenir Next" charset="0"/>
+                <a:cs typeface="Avenir Next" charset="0"/>
+              </a:rPr>
+              <a:t>comparatoren</a:t>
+            </a:r>
+            <a:endParaRPr lang="nl-NL" sz="3600" dirty="0" smtClean="0">
+              <a:latin typeface="Avenir Next" charset="0"/>
+              <a:ea typeface="Avenir Next" charset="0"/>
+              <a:cs typeface="Avenir Next" charset="0"/>
+            </a:endParaRPr>
+          </a:p>
+          <a:p>
+            <a:pPr algn="just"/>
+            <a:endParaRPr lang="nl-NL" sz="3600" dirty="0">
+              <a:latin typeface="Avenir Next" charset="0"/>
+              <a:ea typeface="Avenir Next" charset="0"/>
+              <a:cs typeface="Avenir Next" charset="0"/>
+            </a:endParaRPr>
+          </a:p>
+        </p:txBody>
+      </p:sp>
+      <p:sp>
+        <p:nvSpPr>
+          <p:cNvPr id="20" name="Tekstvak 19"/>
+          <p:cNvSpPr txBox="1"/>
+          <p:nvPr/>
+        </p:nvSpPr>
+        <p:spPr>
+          <a:xfrm>
+            <a:off x="1724984" y="16682900"/>
+            <a:ext cx="12115800" cy="16773823"/>
+          </a:xfrm>
+          <a:prstGeom prst="rect">
+            <a:avLst/>
+          </a:prstGeom>
+          <a:noFill/>
+        </p:spPr>
+        <p:txBody>
+          <a:bodyPr wrap="square" rtlCol="0">
+            <a:spAutoFit/>
+          </a:bodyPr>
+          <a:lstStyle/>
+          <a:p>
+            <a:endParaRPr lang="nl-NL" dirty="0" smtClean="0">
+              <a:latin typeface="Avenir Next" charset="0"/>
+              <a:ea typeface="Avenir Next" charset="0"/>
+              <a:cs typeface="Avenir Next" charset="0"/>
+            </a:endParaRPr>
+          </a:p>
+          <a:p>
+            <a:r>
+              <a:rPr lang="nl-NL" sz="4000" b="1" dirty="0" smtClean="0">
+                <a:latin typeface="Avenir Next" charset="0"/>
+                <a:ea typeface="Avenir Next" charset="0"/>
+                <a:cs typeface="Avenir Next" charset="0"/>
+              </a:rPr>
+              <a:t>Introductie</a:t>
+            </a:r>
+            <a:endParaRPr lang="nl-NL" sz="4200" b="1" dirty="0" smtClean="0">
+              <a:latin typeface="Avenir Next" charset="0"/>
+              <a:ea typeface="Avenir Next" charset="0"/>
+              <a:cs typeface="Avenir Next" charset="0"/>
+            </a:endParaRPr>
+          </a:p>
+          <a:p>
+            <a:pPr algn="just"/>
+            <a:r>
+              <a:rPr lang="nl-NL" sz="3600" dirty="0" smtClean="0">
+                <a:latin typeface="Avenir Next" charset="0"/>
+                <a:ea typeface="Avenir Next" charset="0"/>
+                <a:cs typeface="Avenir Next" charset="0"/>
+              </a:rPr>
+              <a:t>Voert input van het begin naar het einde.</a:t>
+            </a:r>
+          </a:p>
+          <a:p>
+            <a:pPr algn="just"/>
+            <a:endParaRPr lang="nl-NL" sz="3600" dirty="0" smtClean="0">
+              <a:latin typeface="Avenir Next" charset="0"/>
+              <a:ea typeface="Avenir Next" charset="0"/>
+              <a:cs typeface="Avenir Next" charset="0"/>
+            </a:endParaRPr>
+          </a:p>
+          <a:p>
+            <a:pPr algn="just"/>
+            <a:endParaRPr lang="nl-NL" sz="3600" dirty="0">
+              <a:latin typeface="Avenir Next" charset="0"/>
+              <a:ea typeface="Avenir Next" charset="0"/>
+              <a:cs typeface="Avenir Next" charset="0"/>
+            </a:endParaRPr>
+          </a:p>
+          <a:p>
+            <a:pPr algn="just"/>
+            <a:endParaRPr lang="nl-NL" sz="3600" dirty="0" smtClean="0">
+              <a:latin typeface="Avenir Next" charset="0"/>
+              <a:ea typeface="Avenir Next" charset="0"/>
+              <a:cs typeface="Avenir Next" charset="0"/>
+            </a:endParaRPr>
+          </a:p>
+          <a:p>
+            <a:pPr algn="just"/>
+            <a:endParaRPr lang="nl-NL" sz="3600" dirty="0">
+              <a:latin typeface="Avenir Next" charset="0"/>
+              <a:ea typeface="Avenir Next" charset="0"/>
+              <a:cs typeface="Avenir Next" charset="0"/>
+            </a:endParaRPr>
+          </a:p>
+          <a:p>
+            <a:pPr algn="just"/>
+            <a:endParaRPr lang="nl-NL" sz="3600" dirty="0" smtClean="0">
+              <a:latin typeface="Avenir Next" charset="0"/>
+              <a:ea typeface="Avenir Next" charset="0"/>
+              <a:cs typeface="Avenir Next" charset="0"/>
+            </a:endParaRPr>
+          </a:p>
+          <a:p>
+            <a:pPr algn="just"/>
+            <a:r>
+              <a:rPr lang="nl-NL" sz="4000" b="1" dirty="0" smtClean="0">
+                <a:latin typeface="Avenir Next" charset="0"/>
+                <a:ea typeface="Avenir Next" charset="0"/>
+                <a:cs typeface="Avenir Next" charset="0"/>
+              </a:rPr>
+              <a:t>Kanaal</a:t>
+            </a:r>
+          </a:p>
+          <a:p>
+            <a:pPr algn="just"/>
+            <a:r>
+              <a:rPr lang="nl-NL" sz="3600" dirty="0" smtClean="0">
+                <a:latin typeface="Avenir Next" charset="0"/>
+                <a:ea typeface="Avenir Next" charset="0"/>
+                <a:cs typeface="Avenir Next" charset="0"/>
+              </a:rPr>
+              <a:t>Een </a:t>
+            </a:r>
+            <a:r>
+              <a:rPr lang="nl-NL" sz="3600" dirty="0" err="1" smtClean="0">
+                <a:latin typeface="Avenir Next" charset="0"/>
+                <a:ea typeface="Avenir Next" charset="0"/>
+                <a:cs typeface="Avenir Next" charset="0"/>
+              </a:rPr>
+              <a:t>comparator</a:t>
+            </a:r>
+            <a:r>
+              <a:rPr lang="nl-NL" sz="3600" dirty="0" smtClean="0">
+                <a:latin typeface="Avenir Next" charset="0"/>
+                <a:ea typeface="Avenir Next" charset="0"/>
+                <a:cs typeface="Avenir Next" charset="0"/>
+              </a:rPr>
+              <a:t> neemt de input verkregen door twee verbonden kanalen en geeft de waarden in gesorteerde volgorde terug.</a:t>
+            </a:r>
+          </a:p>
+          <a:p>
+            <a:pPr algn="just"/>
+            <a:endParaRPr lang="nl-NL" sz="3600" dirty="0" smtClean="0">
+              <a:latin typeface="Avenir Next" charset="0"/>
+              <a:ea typeface="Avenir Next" charset="0"/>
+              <a:cs typeface="Avenir Next" charset="0"/>
+            </a:endParaRPr>
+          </a:p>
+          <a:p>
+            <a:pPr algn="just"/>
+            <a:endParaRPr lang="nl-NL" sz="3600" dirty="0">
+              <a:latin typeface="Avenir Next" charset="0"/>
+              <a:ea typeface="Avenir Next" charset="0"/>
+              <a:cs typeface="Avenir Next" charset="0"/>
+            </a:endParaRPr>
+          </a:p>
+          <a:p>
+            <a:pPr algn="just"/>
+            <a:endParaRPr lang="nl-NL" sz="3600" dirty="0" smtClean="0">
+              <a:latin typeface="Avenir Next" charset="0"/>
+              <a:ea typeface="Avenir Next" charset="0"/>
+              <a:cs typeface="Avenir Next" charset="0"/>
+            </a:endParaRPr>
+          </a:p>
+          <a:p>
+            <a:pPr algn="just"/>
+            <a:endParaRPr lang="nl-NL" sz="3600" dirty="0">
+              <a:latin typeface="Avenir Next" charset="0"/>
+              <a:ea typeface="Avenir Next" charset="0"/>
+              <a:cs typeface="Avenir Next" charset="0"/>
+            </a:endParaRPr>
+          </a:p>
+          <a:p>
+            <a:pPr algn="just"/>
+            <a:endParaRPr lang="nl-NL" sz="3600" dirty="0">
+              <a:latin typeface="Avenir Next" charset="0"/>
+              <a:ea typeface="Avenir Next" charset="0"/>
+              <a:cs typeface="Avenir Next" charset="0"/>
+            </a:endParaRPr>
+          </a:p>
+          <a:p>
+            <a:pPr algn="just"/>
+            <a:r>
+              <a:rPr lang="nl-NL" sz="4000" b="1" dirty="0" smtClean="0">
+                <a:latin typeface="Avenir Next" charset="0"/>
+                <a:ea typeface="Avenir Next" charset="0"/>
+                <a:cs typeface="Avenir Next" charset="0"/>
+              </a:rPr>
+              <a:t>Sorteernetwerk</a:t>
+            </a:r>
+          </a:p>
+          <a:p>
+            <a:pPr algn="just"/>
+            <a:r>
+              <a:rPr lang="nl-NL" sz="3600" dirty="0" smtClean="0">
+                <a:latin typeface="Avenir Next" charset="0"/>
+                <a:ea typeface="Avenir Next" charset="0"/>
+                <a:cs typeface="Avenir Next" charset="0"/>
+              </a:rPr>
+              <a:t>Een sorteernetwerk is een </a:t>
+            </a:r>
+            <a:r>
+              <a:rPr lang="nl-NL" sz="3600" dirty="0" err="1" smtClean="0">
+                <a:latin typeface="Avenir Next" charset="0"/>
+                <a:ea typeface="Avenir Next" charset="0"/>
+                <a:cs typeface="Avenir Next" charset="0"/>
+              </a:rPr>
+              <a:t>comparator</a:t>
+            </a:r>
+            <a:r>
+              <a:rPr lang="nl-NL" sz="3600" dirty="0" smtClean="0">
+                <a:latin typeface="Avenir Next" charset="0"/>
+                <a:ea typeface="Avenir Next" charset="0"/>
+                <a:cs typeface="Avenir Next" charset="0"/>
+              </a:rPr>
+              <a:t> netwerk dat voor elk mogelijke input een gesorteerde output levert. Er wordt onder meer onderzoek verricht naar de optimale grootte bij sorteernetwerken. Een sorteernetwerk met n kanalen van optimale grootte houdt in dat er geen ander sorteernetwerk bestaat voor n kanalen met minder </a:t>
+            </a:r>
+            <a:r>
+              <a:rPr lang="nl-NL" sz="3600" dirty="0" err="1" smtClean="0">
+                <a:latin typeface="Avenir Next" charset="0"/>
+                <a:ea typeface="Avenir Next" charset="0"/>
+                <a:cs typeface="Avenir Next" charset="0"/>
+              </a:rPr>
+              <a:t>comparatoren</a:t>
+            </a:r>
+            <a:r>
+              <a:rPr lang="nl-NL" sz="3600" dirty="0" smtClean="0">
+                <a:latin typeface="Avenir Next" charset="0"/>
+                <a:ea typeface="Avenir Next" charset="0"/>
+                <a:cs typeface="Avenir Next" charset="0"/>
+              </a:rPr>
+              <a:t>.</a:t>
+            </a:r>
+          </a:p>
+          <a:p>
+            <a:pPr algn="just"/>
+            <a:endParaRPr lang="nl-NL" sz="3600" dirty="0">
+              <a:latin typeface="Avenir Next" charset="0"/>
+              <a:ea typeface="Avenir Next" charset="0"/>
+              <a:cs typeface="Avenir Next" charset="0"/>
+            </a:endParaRPr>
+          </a:p>
+          <a:p>
+            <a:pPr algn="just"/>
+            <a:endParaRPr lang="nl-NL" sz="3600" dirty="0" smtClean="0">
+              <a:latin typeface="Avenir Next" charset="0"/>
+              <a:ea typeface="Avenir Next" charset="0"/>
+              <a:cs typeface="Avenir Next" charset="0"/>
+            </a:endParaRPr>
+          </a:p>
+          <a:p>
+            <a:pPr algn="just"/>
+            <a:endParaRPr lang="nl-NL" sz="3600" dirty="0">
+              <a:latin typeface="Avenir Next" charset="0"/>
+              <a:ea typeface="Avenir Next" charset="0"/>
+              <a:cs typeface="Avenir Next" charset="0"/>
+            </a:endParaRPr>
+          </a:p>
+          <a:p>
+            <a:pPr algn="just"/>
+            <a:endParaRPr lang="nl-NL" sz="3600" dirty="0" smtClean="0">
+              <a:latin typeface="Avenir Next" charset="0"/>
+              <a:ea typeface="Avenir Next" charset="0"/>
+              <a:cs typeface="Avenir Next" charset="0"/>
+            </a:endParaRPr>
+          </a:p>
+          <a:p>
+            <a:pPr algn="just"/>
+            <a:endParaRPr lang="nl-NL" sz="3600" dirty="0">
+              <a:latin typeface="Avenir Next" charset="0"/>
+              <a:ea typeface="Avenir Next" charset="0"/>
+              <a:cs typeface="Avenir Next" charset="0"/>
+            </a:endParaRPr>
+          </a:p>
+        </p:txBody>
+      </p:sp>
+      <p:sp>
+        <p:nvSpPr>
+          <p:cNvPr id="21" name="Tekstvak 20"/>
+          <p:cNvSpPr txBox="1"/>
+          <p:nvPr/>
+        </p:nvSpPr>
+        <p:spPr>
+          <a:xfrm>
+            <a:off x="16167868" y="16682899"/>
+            <a:ext cx="12115800" cy="15665827"/>
+          </a:xfrm>
+          <a:prstGeom prst="rect">
+            <a:avLst/>
+          </a:prstGeom>
+          <a:noFill/>
+        </p:spPr>
+        <p:txBody>
+          <a:bodyPr wrap="square" rtlCol="0">
+            <a:spAutoFit/>
+          </a:bodyPr>
+          <a:lstStyle/>
+          <a:p>
+            <a:endParaRPr lang="nl-NL" dirty="0" smtClean="0">
+              <a:latin typeface="Avenir Next" charset="0"/>
+              <a:ea typeface="Avenir Next" charset="0"/>
+              <a:cs typeface="Avenir Next" charset="0"/>
+            </a:endParaRPr>
+          </a:p>
+          <a:p>
+            <a:r>
+              <a:rPr lang="nl-NL" sz="4200" b="1" dirty="0" smtClean="0">
+                <a:latin typeface="Avenir Next" charset="0"/>
+                <a:ea typeface="Avenir Next" charset="0"/>
+                <a:cs typeface="Avenir Next" charset="0"/>
+              </a:rPr>
+              <a:t>		Resultaten</a:t>
+            </a:r>
+          </a:p>
+          <a:p>
+            <a:pPr algn="just"/>
+            <a:r>
+              <a:rPr lang="nl-NL" sz="3600" dirty="0" smtClean="0">
+                <a:latin typeface="Avenir Next" charset="0"/>
+                <a:ea typeface="Avenir Next" charset="0"/>
+                <a:cs typeface="Avenir Next" charset="0"/>
+              </a:rPr>
+              <a:t>	Sorteernetwerken zorgen voor een klassiek formeel model voor de 	presentatie van enkele sorteeralgoritmen. Door onderzoek naar deze sorteernetwerpen kunnen mogelijke inzichten ontstaan over sorteerproblemen. Zo hebben </a:t>
+            </a:r>
+            <a:r>
+              <a:rPr lang="nl-NL" sz="3600" dirty="0" err="1" smtClean="0">
+                <a:latin typeface="Avenir Next" charset="0"/>
+                <a:ea typeface="Avenir Next" charset="0"/>
+                <a:cs typeface="Avenir Next" charset="0"/>
+              </a:rPr>
+              <a:t>Codish</a:t>
+            </a:r>
+            <a:r>
+              <a:rPr lang="nl-NL" sz="3600" dirty="0" smtClean="0">
+                <a:latin typeface="Avenir Next" charset="0"/>
+                <a:ea typeface="Avenir Next" charset="0"/>
+                <a:cs typeface="Avenir Next" charset="0"/>
+              </a:rPr>
+              <a:t> et al. [1] aangetoond, via sorteernetwerken, dat het sorteren van 9 elementen een minimum van 25 vergelijkingen (</a:t>
+            </a:r>
+            <a:r>
+              <a:rPr lang="nl-NL" sz="3600" dirty="0" err="1" smtClean="0">
+                <a:latin typeface="Avenir Next" charset="0"/>
+                <a:ea typeface="Avenir Next" charset="0"/>
+                <a:cs typeface="Avenir Next" charset="0"/>
+              </a:rPr>
+              <a:t>comparatoren</a:t>
+            </a:r>
+            <a:r>
+              <a:rPr lang="nl-NL" sz="3600" dirty="0" smtClean="0">
+                <a:latin typeface="Avenir Next" charset="0"/>
+                <a:ea typeface="Avenir Next" charset="0"/>
+                <a:cs typeface="Avenir Next" charset="0"/>
+              </a:rPr>
+              <a:t>) vereist. Dit onderzoek 	bouwt hierop verder.</a:t>
+            </a:r>
+          </a:p>
+          <a:p>
+            <a:pPr algn="just"/>
+            <a:endParaRPr lang="nl-NL" sz="3600" dirty="0" smtClean="0">
+              <a:latin typeface="Avenir Next" charset="0"/>
+              <a:ea typeface="Avenir Next" charset="0"/>
+              <a:cs typeface="Avenir Next" charset="0"/>
+            </a:endParaRPr>
+          </a:p>
+          <a:p>
+            <a:pPr algn="just"/>
+            <a:endParaRPr lang="nl-NL" sz="3600" dirty="0">
+              <a:latin typeface="Avenir Next" charset="0"/>
+              <a:ea typeface="Avenir Next" charset="0"/>
+              <a:cs typeface="Avenir Next" charset="0"/>
+            </a:endParaRPr>
+          </a:p>
+          <a:p>
+            <a:pPr algn="just"/>
+            <a:endParaRPr lang="nl-NL" sz="3600" dirty="0" smtClean="0">
+              <a:latin typeface="Avenir Next" charset="0"/>
+              <a:ea typeface="Avenir Next" charset="0"/>
+              <a:cs typeface="Avenir Next" charset="0"/>
+            </a:endParaRPr>
+          </a:p>
+          <a:p>
+            <a:pPr algn="just"/>
+            <a:endParaRPr lang="nl-NL" sz="3600" dirty="0">
+              <a:latin typeface="Avenir Next" charset="0"/>
+              <a:ea typeface="Avenir Next" charset="0"/>
+              <a:cs typeface="Avenir Next" charset="0"/>
+            </a:endParaRPr>
+          </a:p>
+          <a:p>
+            <a:pPr algn="just"/>
+            <a:endParaRPr lang="nl-NL" sz="3600" dirty="0" smtClean="0">
+              <a:latin typeface="Avenir Next" charset="0"/>
+              <a:ea typeface="Avenir Next" charset="0"/>
+              <a:cs typeface="Avenir Next" charset="0"/>
+            </a:endParaRPr>
+          </a:p>
+          <a:p>
+            <a:pPr algn="just"/>
+            <a:endParaRPr lang="nl-NL" sz="3600" dirty="0">
+              <a:latin typeface="Avenir Next" charset="0"/>
+              <a:ea typeface="Avenir Next" charset="0"/>
+              <a:cs typeface="Avenir Next" charset="0"/>
+            </a:endParaRPr>
+          </a:p>
+          <a:p>
+            <a:pPr algn="just"/>
+            <a:endParaRPr lang="nl-NL" sz="3600" dirty="0" smtClean="0">
+              <a:latin typeface="Avenir Next" charset="0"/>
+              <a:ea typeface="Avenir Next" charset="0"/>
+              <a:cs typeface="Avenir Next" charset="0"/>
+            </a:endParaRPr>
+          </a:p>
+          <a:p>
+            <a:pPr algn="just"/>
+            <a:endParaRPr lang="nl-NL" sz="3600" dirty="0">
+              <a:latin typeface="Avenir Next" charset="0"/>
+              <a:ea typeface="Avenir Next" charset="0"/>
+              <a:cs typeface="Avenir Next" charset="0"/>
+            </a:endParaRPr>
+          </a:p>
+          <a:p>
+            <a:pPr algn="just"/>
+            <a:endParaRPr lang="nl-NL" sz="3600" dirty="0">
+              <a:latin typeface="Avenir Next" charset="0"/>
+              <a:ea typeface="Avenir Next" charset="0"/>
+              <a:cs typeface="Avenir Next" charset="0"/>
+            </a:endParaRPr>
+          </a:p>
+          <a:p>
+            <a:pPr algn="just"/>
+            <a:endParaRPr lang="nl-NL" sz="3600" dirty="0" smtClean="0">
+              <a:latin typeface="Avenir Next" charset="0"/>
+              <a:ea typeface="Avenir Next" charset="0"/>
+              <a:cs typeface="Avenir Next" charset="0"/>
+            </a:endParaRPr>
+          </a:p>
+          <a:p>
+            <a:pPr algn="just"/>
+            <a:r>
+              <a:rPr lang="nl-NL" sz="4200" b="1" dirty="0" smtClean="0">
+                <a:latin typeface="Avenir Next" charset="0"/>
+                <a:ea typeface="Avenir Next" charset="0"/>
+                <a:cs typeface="Avenir Next" charset="0"/>
+              </a:rPr>
+              <a:t>Conclusie</a:t>
+            </a:r>
+          </a:p>
+          <a:p>
+            <a:pPr algn="just"/>
+            <a:endParaRPr lang="nl-NL" sz="3600" dirty="0">
+              <a:latin typeface="Avenir Next" charset="0"/>
+              <a:ea typeface="Avenir Next" charset="0"/>
+              <a:cs typeface="Avenir Next" charset="0"/>
+            </a:endParaRPr>
+          </a:p>
+          <a:p>
+            <a:pPr algn="just"/>
+            <a:endParaRPr lang="nl-NL" sz="3600" dirty="0" smtClean="0">
+              <a:latin typeface="Avenir Next" charset="0"/>
+              <a:ea typeface="Avenir Next" charset="0"/>
+              <a:cs typeface="Avenir Next" charset="0"/>
+            </a:endParaRPr>
+          </a:p>
+          <a:p>
+            <a:pPr algn="just"/>
+            <a:endParaRPr lang="nl-NL" sz="3600" dirty="0">
+              <a:latin typeface="Avenir Next" charset="0"/>
+              <a:ea typeface="Avenir Next" charset="0"/>
+              <a:cs typeface="Avenir Next" charset="0"/>
+            </a:endParaRPr>
+          </a:p>
+          <a:p>
+            <a:pPr algn="just"/>
+            <a:endParaRPr lang="nl-NL" sz="3600" dirty="0" smtClean="0">
+              <a:latin typeface="Avenir Next" charset="0"/>
+              <a:ea typeface="Avenir Next" charset="0"/>
+              <a:cs typeface="Avenir Next" charset="0"/>
+            </a:endParaRPr>
+          </a:p>
+          <a:p>
+            <a:pPr algn="just"/>
+            <a:endParaRPr lang="nl-NL" sz="3600" dirty="0" smtClean="0">
+              <a:latin typeface="Avenir Next" charset="0"/>
+              <a:ea typeface="Avenir Next" charset="0"/>
+              <a:cs typeface="Avenir Next" charset="0"/>
+            </a:endParaRPr>
+          </a:p>
+          <a:p>
+            <a:pPr algn="just"/>
+            <a:endParaRPr lang="nl-NL" sz="3600" dirty="0" smtClean="0">
+              <a:latin typeface="Avenir Next" charset="0"/>
+              <a:ea typeface="Avenir Next" charset="0"/>
+              <a:cs typeface="Avenir Next" charset="0"/>
+            </a:endParaRPr>
+          </a:p>
+        </p:txBody>
+      </p:sp>
+      <p:sp>
+        <p:nvSpPr>
+          <p:cNvPr id="22" name="Tekstvak 21"/>
+          <p:cNvSpPr txBox="1"/>
+          <p:nvPr/>
+        </p:nvSpPr>
+        <p:spPr>
+          <a:xfrm>
+            <a:off x="16167868" y="37634676"/>
+            <a:ext cx="12115800" cy="2277547"/>
+          </a:xfrm>
+          <a:prstGeom prst="rect">
+            <a:avLst/>
+          </a:prstGeom>
+          <a:noFill/>
+        </p:spPr>
+        <p:txBody>
+          <a:bodyPr wrap="square" rtlCol="0">
+            <a:spAutoFit/>
+          </a:bodyPr>
+          <a:lstStyle/>
+          <a:p>
+            <a:endParaRPr lang="nl-NL" dirty="0" smtClean="0">
+              <a:latin typeface="Avenir Next" charset="0"/>
+              <a:ea typeface="Avenir Next" charset="0"/>
+              <a:cs typeface="Avenir Next" charset="0"/>
+            </a:endParaRPr>
+          </a:p>
+          <a:p>
+            <a:r>
+              <a:rPr lang="nl-NL" sz="4200" b="1" dirty="0" smtClean="0">
+                <a:latin typeface="Avenir Next" charset="0"/>
+                <a:ea typeface="Avenir Next" charset="0"/>
+                <a:cs typeface="Avenir Next" charset="0"/>
+              </a:rPr>
+              <a:t>Erkenning</a:t>
+            </a:r>
+          </a:p>
+          <a:p>
+            <a:pPr algn="just"/>
+            <a:r>
+              <a:rPr lang="nl-NL" sz="3600" dirty="0" smtClean="0">
+                <a:latin typeface="Avenir Next" charset="0"/>
+                <a:ea typeface="Avenir Next" charset="0"/>
+                <a:cs typeface="Avenir Next" charset="0"/>
+              </a:rPr>
+              <a:t>Prof. Dr. Ir. Tom Schrijvers</a:t>
+            </a:r>
+          </a:p>
+          <a:p>
+            <a:pPr marL="571500" indent="-571500" algn="just">
+              <a:buFont typeface="Arial" charset="0"/>
+              <a:buChar char="•"/>
+            </a:pPr>
+            <a:endParaRPr lang="nl-NL" sz="3600" dirty="0">
+              <a:latin typeface="Avenir Next" charset="0"/>
+              <a:ea typeface="Avenir Next" charset="0"/>
+              <a:cs typeface="Avenir Next" charset="0"/>
+            </a:endParaRPr>
+          </a:p>
+        </p:txBody>
+      </p:sp>
+      <p:sp>
+        <p:nvSpPr>
+          <p:cNvPr id="23" name="Tekstvak 22"/>
+          <p:cNvSpPr txBox="1"/>
+          <p:nvPr/>
+        </p:nvSpPr>
+        <p:spPr>
+          <a:xfrm>
+            <a:off x="1724984" y="37634675"/>
+            <a:ext cx="12115800" cy="2277547"/>
+          </a:xfrm>
+          <a:prstGeom prst="rect">
+            <a:avLst/>
+          </a:prstGeom>
+          <a:noFill/>
+        </p:spPr>
+        <p:txBody>
+          <a:bodyPr wrap="square" rtlCol="0">
+            <a:spAutoFit/>
+          </a:bodyPr>
+          <a:lstStyle/>
+          <a:p>
+            <a:endParaRPr lang="nl-NL" dirty="0" smtClean="0">
+              <a:latin typeface="Avenir Next" charset="0"/>
+              <a:ea typeface="Avenir Next" charset="0"/>
+              <a:cs typeface="Avenir Next" charset="0"/>
+            </a:endParaRPr>
+          </a:p>
+          <a:p>
+            <a:r>
+              <a:rPr lang="nl-NL" sz="4200" b="1" dirty="0" smtClean="0">
+                <a:latin typeface="Avenir Next" charset="0"/>
+                <a:ea typeface="Avenir Next" charset="0"/>
+                <a:cs typeface="Avenir Next" charset="0"/>
+              </a:rPr>
+              <a:t>Referenties</a:t>
+            </a:r>
+          </a:p>
+          <a:p>
+            <a:pPr algn="just"/>
+            <a:r>
+              <a:rPr lang="nl-NL" sz="3600" dirty="0" smtClean="0">
+                <a:latin typeface="Avenir Next" charset="0"/>
+                <a:ea typeface="Avenir Next" charset="0"/>
+                <a:cs typeface="Avenir Next" charset="0"/>
+              </a:rPr>
+              <a:t>//TODO</a:t>
+            </a:r>
+          </a:p>
+          <a:p>
+            <a:pPr marL="571500" indent="-571500" algn="just">
+              <a:buFont typeface="Arial" charset="0"/>
+              <a:buChar char="•"/>
+            </a:pPr>
+            <a:endParaRPr lang="nl-NL" sz="3600" dirty="0">
+              <a:latin typeface="Avenir Next" charset="0"/>
+              <a:ea typeface="Avenir Next" charset="0"/>
+              <a:cs typeface="Avenir Next" charset="0"/>
+            </a:endParaRPr>
+          </a:p>
+        </p:txBody>
+      </p:sp>
     </p:spTree>
   </p:cSld>
   <p:clrMapOvr>

</xml_diff>

<commit_message>
Added VSC to poster
</commit_message>
<xml_diff>
--- a/Poster/Poster_herwerking.pptx
+++ b/Poster/Poster_herwerking.pptx
@@ -311,7 +311,7 @@
               <a:pPr>
                 <a:defRPr/>
               </a:pPr>
-              <a:t>2/25/16</a:t>
+              <a:t>2/26/16</a:t>
             </a:fld>
             <a:endParaRPr lang="en-US" altLang="nl-NL"/>
           </a:p>
@@ -5712,7 +5712,7 @@
         <p:spPr>
           <a:xfrm>
             <a:off x="16167868" y="37634676"/>
-            <a:ext cx="12115800" cy="2277547"/>
+            <a:ext cx="12115800" cy="3631763"/>
           </a:xfrm>
           <a:prstGeom prst="rect">
             <a:avLst/>
@@ -5744,20 +5744,87 @@
           <a:p>
             <a:pPr algn="just"/>
             <a:r>
-              <a:rPr lang="nl-NL" sz="3600" dirty="0" smtClean="0">
+              <a:rPr lang="nl-NL" sz="3200" dirty="0" smtClean="0">
                 <a:latin typeface="Avenir Next" charset="0"/>
                 <a:ea typeface="Avenir Next" charset="0"/>
                 <a:cs typeface="Avenir Next" charset="0"/>
               </a:rPr>
-              <a:t>Prof. Dr. Ir. Tom Schrijvers</a:t>
-            </a:r>
-          </a:p>
-          <a:p>
-            <a:pPr marL="571500" indent="-571500" algn="just">
-              <a:buFont typeface="Arial" charset="0"/>
-              <a:buChar char="•"/>
-            </a:pPr>
-            <a:endParaRPr lang="nl-NL" sz="3600" dirty="0">
+              <a:t>Prof. Dr. Ir. Tom </a:t>
+            </a:r>
+            <a:r>
+              <a:rPr lang="nl-NL" sz="3200" dirty="0" smtClean="0">
+                <a:latin typeface="Avenir Next" charset="0"/>
+                <a:ea typeface="Avenir Next" charset="0"/>
+                <a:cs typeface="Avenir Next" charset="0"/>
+              </a:rPr>
+              <a:t>Schrijvers</a:t>
+            </a:r>
+          </a:p>
+          <a:p>
+            <a:pPr algn="just"/>
+            <a:r>
+              <a:rPr lang="nl-NL" sz="3200" dirty="0">
+                <a:latin typeface="Avenir Next" charset="0"/>
+                <a:ea typeface="Avenir Next" charset="0"/>
+                <a:cs typeface="Avenir Next" charset="0"/>
+              </a:rPr>
+              <a:t>De rekeninfrastructuur en </a:t>
+            </a:r>
+            <a:endParaRPr lang="nl-NL" sz="3200" dirty="0">
+              <a:latin typeface="Avenir Next" charset="0"/>
+              <a:ea typeface="Avenir Next" charset="0"/>
+              <a:cs typeface="Avenir Next" charset="0"/>
+            </a:endParaRPr>
+          </a:p>
+          <a:p>
+            <a:pPr algn="just"/>
+            <a:r>
+              <a:rPr lang="nl-NL" sz="3200" dirty="0" smtClean="0">
+                <a:latin typeface="Avenir Next" charset="0"/>
+                <a:ea typeface="Avenir Next" charset="0"/>
+                <a:cs typeface="Avenir Next" charset="0"/>
+              </a:rPr>
+              <a:t>dienstverlening voorzien door </a:t>
+            </a:r>
+          </a:p>
+          <a:p>
+            <a:pPr algn="just"/>
+            <a:r>
+              <a:rPr lang="nl-NL" sz="3200" dirty="0" smtClean="0">
+                <a:latin typeface="Avenir Next" charset="0"/>
+                <a:ea typeface="Avenir Next" charset="0"/>
+                <a:cs typeface="Avenir Next" charset="0"/>
+              </a:rPr>
+              <a:t>het </a:t>
+            </a:r>
+            <a:r>
+              <a:rPr lang="nl-NL" sz="3200" dirty="0">
+                <a:latin typeface="Avenir Next" charset="0"/>
+                <a:ea typeface="Avenir Next" charset="0"/>
+                <a:cs typeface="Avenir Next" charset="0"/>
+              </a:rPr>
+              <a:t>VSC (Vlaams </a:t>
+            </a:r>
+            <a:r>
+              <a:rPr lang="nl-NL" sz="3200" dirty="0" smtClean="0">
+                <a:latin typeface="Avenir Next" charset="0"/>
+                <a:ea typeface="Avenir Next" charset="0"/>
+                <a:cs typeface="Avenir Next" charset="0"/>
+              </a:rPr>
+              <a:t>Supercomputer</a:t>
+            </a:r>
+          </a:p>
+          <a:p>
+            <a:pPr algn="just"/>
+            <a:r>
+              <a:rPr lang="nl-NL" sz="3200" dirty="0" smtClean="0">
+                <a:latin typeface="Avenir Next" charset="0"/>
+                <a:ea typeface="Avenir Next" charset="0"/>
+                <a:cs typeface="Avenir Next" charset="0"/>
+              </a:rPr>
+              <a:t>Centrum)</a:t>
+            </a:r>
+            <a:endParaRPr lang="nl-NL" sz="4000" dirty="0">
               <a:latin typeface="Avenir Next" charset="0"/>
               <a:ea typeface="Avenir Next" charset="0"/>
               <a:cs typeface="Avenir Next" charset="0"/>

</xml_diff>

<commit_message>
Newer version of Poster
</commit_message>
<xml_diff>
--- a/Poster/Poster_herwerking.pptx
+++ b/Poster/Poster_herwerking.pptx
@@ -311,7 +311,7 @@
               <a:pPr>
                 <a:defRPr/>
               </a:pPr>
-              <a:t>2/27/16</a:t>
+              <a:t>2/28/16</a:t>
             </a:fld>
             <a:endParaRPr lang="en-US" altLang="nl-NL"/>
           </a:p>
@@ -4600,7 +4600,7 @@
           <a:lstStyle/>
           <a:p>
             <a:pPr algn="ctr"/>
-            <a:endParaRPr lang="nl-NL"/>
+            <a:endParaRPr lang="nl-NL" dirty="0"/>
           </a:p>
         </p:txBody>
       </p:sp>
@@ -4650,7 +4650,7 @@
           <a:lstStyle/>
           <a:p>
             <a:pPr algn="ctr"/>
-            <a:endParaRPr lang="nl-NL"/>
+            <a:endParaRPr lang="nl-NL" dirty="0"/>
           </a:p>
         </p:txBody>
       </p:sp>
@@ -4663,7 +4663,7 @@
         <p:spPr>
           <a:xfrm>
             <a:off x="1122884" y="16704113"/>
-            <a:ext cx="13320000" cy="18641407"/>
+            <a:ext cx="13320000" cy="20165411"/>
           </a:xfrm>
           <a:prstGeom prst="snip1Rect">
             <a:avLst/>
@@ -4698,7 +4698,7 @@
           <a:lstStyle/>
           <a:p>
             <a:pPr algn="ctr"/>
-            <a:endParaRPr lang="nl-NL"/>
+            <a:endParaRPr lang="nl-NL" dirty="0"/>
           </a:p>
         </p:txBody>
       </p:sp>
@@ -4711,7 +4711,7 @@
         <p:spPr>
           <a:xfrm flipH="1">
             <a:off x="15565768" y="16682900"/>
-            <a:ext cx="13320000" cy="18662619"/>
+            <a:ext cx="13320000" cy="20186624"/>
           </a:xfrm>
           <a:prstGeom prst="snip1Rect">
             <a:avLst/>
@@ -4746,7 +4746,7 @@
           <a:lstStyle/>
           <a:p>
             <a:pPr algn="ctr"/>
-            <a:endParaRPr lang="nl-NL"/>
+            <a:endParaRPr lang="nl-NL" dirty="0"/>
           </a:p>
         </p:txBody>
       </p:sp>
@@ -4758,7 +4758,7 @@
         </p:nvSpPr>
         <p:spPr>
           <a:xfrm>
-            <a:off x="1122884" y="37634677"/>
+            <a:off x="1122884" y="38026564"/>
             <a:ext cx="13320000" cy="3906982"/>
           </a:xfrm>
           <a:prstGeom prst="rect">
@@ -4784,7 +4784,7 @@
           <a:lstStyle/>
           <a:p>
             <a:pPr algn="ctr"/>
-            <a:endParaRPr lang="nl-NL"/>
+            <a:endParaRPr lang="nl-NL" dirty="0"/>
           </a:p>
         </p:txBody>
       </p:sp>
@@ -4796,7 +4796,7 @@
         </p:nvSpPr>
         <p:spPr>
           <a:xfrm>
-            <a:off x="15565768" y="37634677"/>
+            <a:off x="15565768" y="38026564"/>
             <a:ext cx="13320000" cy="3906982"/>
           </a:xfrm>
           <a:prstGeom prst="rect">
@@ -4822,7 +4822,7 @@
           <a:lstStyle/>
           <a:p>
             <a:pPr algn="ctr"/>
-            <a:endParaRPr lang="nl-NL"/>
+            <a:endParaRPr lang="nl-NL" dirty="0"/>
           </a:p>
         </p:txBody>
       </p:sp>
@@ -4834,7 +4834,7 @@
         </p:nvSpPr>
         <p:spPr>
           <a:xfrm>
-            <a:off x="-1" y="36382099"/>
+            <a:off x="-1" y="37340044"/>
             <a:ext cx="30267276" cy="216000"/>
           </a:xfrm>
           <a:prstGeom prst="rect">
@@ -4866,7 +4866,7 @@
           <a:lstStyle/>
           <a:p>
             <a:pPr algn="ctr"/>
-            <a:endParaRPr lang="nl-NL"/>
+            <a:endParaRPr lang="nl-NL" dirty="0"/>
           </a:p>
         </p:txBody>
       </p:sp>
@@ -4892,7 +4892,7 @@
         </p:blipFill>
         <p:spPr>
           <a:xfrm>
-            <a:off x="22562749" y="39285643"/>
+            <a:off x="22562749" y="39721073"/>
             <a:ext cx="6350000" cy="2273300"/>
           </a:xfrm>
           <a:prstGeom prst="rect">
@@ -4962,15 +4962,15 @@
                 <a:ea typeface="Avenir Next" charset="0"/>
                 <a:cs typeface="Avenir Next" charset="0"/>
               </a:rPr>
-              <a:t> et al. [1] aangetoond, via sorteernetwerken, dat het sorteren van 9 elementen een minimum van 25 vergelijkingen (</a:t>
-            </a:r>
-            <a:r>
-              <a:rPr lang="nl-NL" sz="3600" dirty="0" err="1" smtClean="0">
+              <a:t> </a:t>
+            </a:r>
+            <a:r>
+              <a:rPr lang="nl-NL" sz="3600" i="1" dirty="0" smtClean="0">
                 <a:latin typeface="Avenir Next" charset="0"/>
                 <a:ea typeface="Avenir Next" charset="0"/>
                 <a:cs typeface="Avenir Next" charset="0"/>
               </a:rPr>
-              <a:t>comparatoren</a:t>
+              <a:t>et al.</a:t>
             </a:r>
             <a:r>
               <a:rPr lang="nl-NL" sz="3600" dirty="0" smtClean="0">
@@ -4978,7 +4978,7 @@
                 <a:ea typeface="Avenir Next" charset="0"/>
                 <a:cs typeface="Avenir Next" charset="0"/>
               </a:rPr>
-              <a:t>) vereist. Dit onderzoek 	bouwt hierop verder.</a:t>
+              <a:t> [1] aangetoond, via sorteernetwerken, dat het sorteren van 9 elementen een minimum van 25 vergelijkingen (comparatoren) vereist. Dit onderzoek 	bouwt hierop verder.</a:t>
             </a:r>
           </a:p>
           <a:p>
@@ -5027,23 +5027,7 @@
                 <a:ea typeface="Avenir Next" charset="0"/>
                 <a:cs typeface="Avenir Next" charset="0"/>
               </a:rPr>
-              <a:t> et al. [1] voor een sorteernetwerk van 9 kanalen en 25 </a:t>
-            </a:r>
-            <a:r>
-              <a:rPr lang="nl-NL" sz="3600" dirty="0" err="1" smtClean="0">
-                <a:latin typeface="Avenir Next" charset="0"/>
-                <a:ea typeface="Avenir Next" charset="0"/>
-                <a:cs typeface="Avenir Next" charset="0"/>
-              </a:rPr>
-              <a:t>comparatoren</a:t>
-            </a:r>
-            <a:r>
-              <a:rPr lang="nl-NL" sz="3600" dirty="0" smtClean="0">
-                <a:latin typeface="Avenir Next" charset="0"/>
-                <a:ea typeface="Avenir Next" charset="0"/>
-                <a:cs typeface="Avenir Next" charset="0"/>
-              </a:rPr>
-              <a:t> te reproduceren.</a:t>
+              <a:t> et al. [1] voor een sorteernetwerk van 9 kanalen en 25 comparatoren te reproduceren.</a:t>
             </a:r>
           </a:p>
           <a:p>
@@ -5127,23 +5111,7 @@
                 <a:ea typeface="Avenir Next" charset="0"/>
                 <a:cs typeface="Avenir Next" charset="0"/>
               </a:rPr>
-              <a:t>Een </a:t>
-            </a:r>
-            <a:r>
-              <a:rPr lang="nl-NL" sz="3600" dirty="0" err="1" smtClean="0">
-                <a:latin typeface="Avenir Next" charset="0"/>
-                <a:ea typeface="Avenir Next" charset="0"/>
-                <a:cs typeface="Avenir Next" charset="0"/>
-              </a:rPr>
-              <a:t>comparator</a:t>
-            </a:r>
-            <a:r>
-              <a:rPr lang="nl-NL" sz="3600" dirty="0" smtClean="0">
-                <a:latin typeface="Avenir Next" charset="0"/>
-                <a:ea typeface="Avenir Next" charset="0"/>
-                <a:cs typeface="Avenir Next" charset="0"/>
-              </a:rPr>
-              <a:t> netwerk is een netwerk dat gegeven een input een partieel gesorteerde permutatie van deze input terug geeft.</a:t>
+              <a:t>Een comparator netwerk is een netwerk dat gegeven een input een partieel gesorteerde permutatie van deze input terug geeft.</a:t>
             </a:r>
           </a:p>
           <a:p>
@@ -5187,21 +5155,8 @@
                 <a:ea typeface="Avenir Next" charset="0"/>
                 <a:cs typeface="Avenir Next" charset="0"/>
               </a:rPr>
-              <a:t> </a:t>
-            </a:r>
-            <a:r>
-              <a:rPr lang="nl-NL" sz="3600" dirty="0" err="1" smtClean="0">
-                <a:latin typeface="Avenir Next" charset="0"/>
-                <a:ea typeface="Avenir Next" charset="0"/>
-                <a:cs typeface="Avenir Next" charset="0"/>
-              </a:rPr>
-              <a:t>comparatoren</a:t>
-            </a:r>
-            <a:endParaRPr lang="nl-NL" sz="3600" dirty="0" smtClean="0">
-              <a:latin typeface="Avenir Next" charset="0"/>
-              <a:ea typeface="Avenir Next" charset="0"/>
-              <a:cs typeface="Avenir Next" charset="0"/>
-            </a:endParaRPr>
+              <a:t> comparatoren</a:t>
+            </a:r>
           </a:p>
           <a:p>
             <a:pPr algn="just"/>
@@ -5222,7 +5177,7 @@
         <p:spPr>
           <a:xfrm>
             <a:off x="1724984" y="16704112"/>
-            <a:ext cx="11700000" cy="16773823"/>
+            <a:ext cx="11700000" cy="18128040"/>
           </a:xfrm>
           <a:prstGeom prst="rect">
             <a:avLst/>
@@ -5235,6 +5190,7 @@
           </a:bodyPr>
           <a:lstStyle/>
           <a:p>
+            <a:pPr algn="just"/>
             <a:endParaRPr lang="nl-NL" dirty="0" smtClean="0">
               <a:latin typeface="Avenir Next" charset="0"/>
               <a:ea typeface="Avenir Next" charset="0"/>
@@ -5242,13 +5198,14 @@
             </a:endParaRPr>
           </a:p>
           <a:p>
+            <a:pPr algn="just"/>
             <a:r>
               <a:rPr lang="nl-NL" sz="4000" b="1" dirty="0" smtClean="0">
                 <a:latin typeface="Avenir Next" charset="0"/>
                 <a:ea typeface="Avenir Next" charset="0"/>
                 <a:cs typeface="Avenir Next" charset="0"/>
               </a:rPr>
-              <a:t>Introductie</a:t>
+              <a:t>Kanaal</a:t>
             </a:r>
             <a:endParaRPr lang="nl-NL" sz="4200" b="1" dirty="0" smtClean="0">
               <a:latin typeface="Avenir Next" charset="0"/>
@@ -5315,8 +5272,13 @@
                 <a:ea typeface="Avenir Next" charset="0"/>
                 <a:cs typeface="Avenir Next" charset="0"/>
               </a:rPr>
-              <a:t>Kanaal</a:t>
-            </a:r>
+              <a:t>Comparator</a:t>
+            </a:r>
+            <a:endParaRPr lang="nl-NL" sz="4000" b="1" dirty="0" smtClean="0">
+              <a:latin typeface="Avenir Next" charset="0"/>
+              <a:ea typeface="Avenir Next" charset="0"/>
+              <a:cs typeface="Avenir Next" charset="0"/>
+            </a:endParaRPr>
           </a:p>
           <a:p>
             <a:pPr algn="just"/>
@@ -5326,23 +5288,7 @@
                 <a:ea typeface="Avenir Next" charset="0"/>
                 <a:cs typeface="Avenir Next" charset="0"/>
               </a:rPr>
-              <a:t>Een </a:t>
-            </a:r>
-            <a:r>
-              <a:rPr lang="nl-NL" sz="3600" dirty="0" err="1" smtClean="0">
-                <a:latin typeface="Avenir Next" charset="0"/>
-                <a:ea typeface="Avenir Next" charset="0"/>
-                <a:cs typeface="Avenir Next" charset="0"/>
-              </a:rPr>
-              <a:t>comparator</a:t>
-            </a:r>
-            <a:r>
-              <a:rPr lang="nl-NL" sz="3600" dirty="0" smtClean="0">
-                <a:latin typeface="Avenir Next" charset="0"/>
-                <a:ea typeface="Avenir Next" charset="0"/>
-                <a:cs typeface="Avenir Next" charset="0"/>
-              </a:rPr>
-              <a:t> neemt de input verkregen door twee verbonden kanalen en geeft de waarden in gesorteerde volgorde terug.</a:t>
+              <a:t>Een comparator neemt de input verkregen door twee verbonden kanalen en geeft de waarden in gesorteerde volgorde terug.</a:t>
             </a:r>
           </a:p>
           <a:p>
@@ -5387,14 +5333,51 @@
           </a:p>
           <a:p>
             <a:pPr algn="just"/>
+            <a:endParaRPr lang="nl-NL" sz="4000" b="1" dirty="0" smtClean="0">
+              <a:latin typeface="Avenir Next" charset="0"/>
+              <a:ea typeface="Avenir Next" charset="0"/>
+              <a:cs typeface="Avenir Next" charset="0"/>
+            </a:endParaRPr>
+          </a:p>
+          <a:p>
+            <a:pPr algn="just"/>
+            <a:endParaRPr lang="nl-NL" sz="4000" b="1" dirty="0" smtClean="0">
+              <a:latin typeface="Avenir Next" charset="0"/>
+              <a:ea typeface="Avenir Next" charset="0"/>
+              <a:cs typeface="Avenir Next" charset="0"/>
+            </a:endParaRPr>
+          </a:p>
+          <a:p>
+            <a:pPr algn="just"/>
+            <a:endParaRPr lang="nl-NL" sz="4000" b="1" dirty="0" smtClean="0">
+              <a:latin typeface="Avenir Next" charset="0"/>
+              <a:ea typeface="Avenir Next" charset="0"/>
+              <a:cs typeface="Avenir Next" charset="0"/>
+            </a:endParaRPr>
+          </a:p>
+          <a:p>
+            <a:pPr algn="just"/>
+            <a:endParaRPr lang="nl-NL" sz="4000" b="1" dirty="0">
+              <a:latin typeface="Avenir Next" charset="0"/>
+              <a:ea typeface="Avenir Next" charset="0"/>
+              <a:cs typeface="Avenir Next" charset="0"/>
+            </a:endParaRPr>
+          </a:p>
+          <a:p>
+            <a:pPr algn="just"/>
             <a:r>
               <a:rPr lang="nl-NL" sz="4000" b="1" dirty="0" smtClean="0">
                 <a:latin typeface="Avenir Next" charset="0"/>
                 <a:ea typeface="Avenir Next" charset="0"/>
                 <a:cs typeface="Avenir Next" charset="0"/>
               </a:rPr>
-              <a:t>Sorteernetwerk</a:t>
-            </a:r>
+              <a:t>Sorteernetwerk van optimale grootte</a:t>
+            </a:r>
+            <a:endParaRPr lang="nl-NL" sz="4000" b="1" dirty="0" smtClean="0">
+              <a:latin typeface="Avenir Next" charset="0"/>
+              <a:ea typeface="Avenir Next" charset="0"/>
+              <a:cs typeface="Avenir Next" charset="0"/>
+            </a:endParaRPr>
           </a:p>
           <a:p>
             <a:pPr algn="just"/>
@@ -5404,15 +5387,7 @@
                 <a:ea typeface="Avenir Next" charset="0"/>
                 <a:cs typeface="Avenir Next" charset="0"/>
               </a:rPr>
-              <a:t>Een sorteernetwerk is een </a:t>
-            </a:r>
-            <a:r>
-              <a:rPr lang="nl-NL" sz="3600" dirty="0" err="1" smtClean="0">
-                <a:latin typeface="Avenir Next" charset="0"/>
-                <a:ea typeface="Avenir Next" charset="0"/>
-                <a:cs typeface="Avenir Next" charset="0"/>
-              </a:rPr>
-              <a:t>comparator</a:t>
+              <a:t>Een sorteernetwerk is een comparator netwerk dat </a:t>
             </a:r>
             <a:r>
               <a:rPr lang="nl-NL" sz="3600" dirty="0" smtClean="0">
@@ -5420,15 +5395,7 @@
                 <a:ea typeface="Avenir Next" charset="0"/>
                 <a:cs typeface="Avenir Next" charset="0"/>
               </a:rPr>
-              <a:t> netwerk dat voor elk mogelijke input een gesorteerde output levert. Er wordt onder meer onderzoek verricht naar de optimale grootte bij sorteernetwerken. Een sorteernetwerk met n kanalen van optimale grootte houdt in dat er geen ander sorteernetwerk bestaat voor n kanalen met minder </a:t>
-            </a:r>
-            <a:r>
-              <a:rPr lang="nl-NL" sz="3600" dirty="0" err="1" smtClean="0">
-                <a:latin typeface="Avenir Next" charset="0"/>
-                <a:ea typeface="Avenir Next" charset="0"/>
-                <a:cs typeface="Avenir Next" charset="0"/>
-              </a:rPr>
-              <a:t>comparatoren</a:t>
+              <a:t>elke </a:t>
             </a:r>
             <a:r>
               <a:rPr lang="nl-NL" sz="3600" dirty="0" smtClean="0">
@@ -5436,7 +5403,55 @@
                 <a:ea typeface="Avenir Next" charset="0"/>
                 <a:cs typeface="Avenir Next" charset="0"/>
               </a:rPr>
-              <a:t>.</a:t>
+              <a:t>mogelijke input </a:t>
+            </a:r>
+            <a:r>
+              <a:rPr lang="nl-NL" sz="3600" dirty="0" smtClean="0">
+                <a:latin typeface="Avenir Next" charset="0"/>
+                <a:ea typeface="Avenir Next" charset="0"/>
+                <a:cs typeface="Avenir Next" charset="0"/>
+              </a:rPr>
+              <a:t>sorteert. Een </a:t>
+            </a:r>
+            <a:r>
+              <a:rPr lang="nl-NL" sz="3600" dirty="0" smtClean="0">
+                <a:latin typeface="Avenir Next" charset="0"/>
+                <a:ea typeface="Avenir Next" charset="0"/>
+                <a:cs typeface="Avenir Next" charset="0"/>
+              </a:rPr>
+              <a:t>sorteernetwerk met </a:t>
+            </a:r>
+            <a:r>
+              <a:rPr lang="nl-NL" sz="3600" dirty="0" smtClean="0">
+                <a:latin typeface="Avenir Next" charset="0"/>
+                <a:ea typeface="Avenir Next" charset="0"/>
+                <a:cs typeface="Avenir Next" charset="0"/>
+              </a:rPr>
+              <a:t>n kanalen </a:t>
+            </a:r>
+            <a:r>
+              <a:rPr lang="nl-NL" sz="3600" dirty="0" smtClean="0">
+                <a:latin typeface="Avenir Next" charset="0"/>
+                <a:ea typeface="Avenir Next" charset="0"/>
+                <a:cs typeface="Avenir Next" charset="0"/>
+              </a:rPr>
+              <a:t>van optimale grootte houdt in dat er geen ander sorteernetwerk bestaat voor </a:t>
+            </a:r>
+            <a:r>
+              <a:rPr lang="nl-NL" sz="3600" dirty="0" smtClean="0">
+                <a:latin typeface="Avenir Next" charset="0"/>
+                <a:ea typeface="Avenir Next" charset="0"/>
+                <a:cs typeface="Avenir Next" charset="0"/>
+              </a:rPr>
+              <a:t>n kanalen </a:t>
+            </a:r>
+            <a:r>
+              <a:rPr lang="nl-NL" sz="3600" dirty="0" smtClean="0">
+                <a:latin typeface="Avenir Next" charset="0"/>
+                <a:ea typeface="Avenir Next" charset="0"/>
+                <a:cs typeface="Avenir Next" charset="0"/>
+              </a:rPr>
+              <a:t>met minder comparatoren.</a:t>
             </a:r>
           </a:p>
           <a:p>
@@ -5543,23 +5558,7 @@
                 <a:ea typeface="Avenir Next" charset="0"/>
                 <a:cs typeface="Avenir Next" charset="0"/>
               </a:rPr>
-              <a:t> et al. [1] aangetoond, via sorteernetwerken, dat het sorteren van 9 elementen een minimum van 25 vergelijkingen (</a:t>
-            </a:r>
-            <a:r>
-              <a:rPr lang="nl-NL" sz="3600" dirty="0" err="1" smtClean="0">
-                <a:latin typeface="Avenir Next" charset="0"/>
-                <a:ea typeface="Avenir Next" charset="0"/>
-                <a:cs typeface="Avenir Next" charset="0"/>
-              </a:rPr>
-              <a:t>comparatoren</a:t>
-            </a:r>
-            <a:r>
-              <a:rPr lang="nl-NL" sz="3600" dirty="0" smtClean="0">
-                <a:latin typeface="Avenir Next" charset="0"/>
-                <a:ea typeface="Avenir Next" charset="0"/>
-                <a:cs typeface="Avenir Next" charset="0"/>
-              </a:rPr>
-              <a:t>) vereist. Dit onderzoek 	bouwt hierop verder.</a:t>
+              <a:t> et al. [1] aangetoond, via sorteernetwerken, dat het sorteren van 9 elementen een minimum van 25 vergelijkingen (comparatoren) vereist. Dit onderzoek 	bouwt hierop verder.</a:t>
             </a:r>
           </a:p>
           <a:p>
@@ -5827,7 +5826,7 @@
         </p:nvSpPr>
         <p:spPr>
           <a:xfrm>
-            <a:off x="1724984" y="37634675"/>
+            <a:off x="1724984" y="38070105"/>
             <a:ext cx="12115800" cy="2277547"/>
           </a:xfrm>
           <a:prstGeom prst="rect">
@@ -6161,8 +6160,8 @@
         </p:nvSpPr>
         <p:spPr>
           <a:xfrm>
-            <a:off x="13840784" y="13630217"/>
-            <a:ext cx="2908829" cy="646331"/>
+            <a:off x="13668026" y="13709311"/>
+            <a:ext cx="2567616" cy="646331"/>
           </a:xfrm>
           <a:prstGeom prst="rect">
             <a:avLst/>
@@ -6176,7 +6175,7 @@
           <a:lstStyle/>
           <a:p>
             <a:r>
-              <a:rPr lang="nl-NL" sz="3600" b="1" dirty="0" err="1" smtClean="0">
+              <a:rPr lang="nl-NL" sz="3600" b="1" smtClean="0">
                 <a:solidFill>
                   <a:srgbClr val="003F77"/>
                 </a:solidFill>
@@ -6184,7 +6183,7 @@
                 <a:ea typeface="Avenir Next" charset="0"/>
                 <a:cs typeface="Avenir Next" charset="0"/>
               </a:rPr>
-              <a:t>Generate</a:t>
+              <a:t>Genereren</a:t>
             </a:r>
             <a:endParaRPr lang="nl-NL" sz="2400" b="1" dirty="0">
               <a:solidFill>
@@ -6205,8 +6204,8 @@
         </p:nvSpPr>
         <p:spPr>
           <a:xfrm>
-            <a:off x="14213604" y="16864310"/>
-            <a:ext cx="1864788" cy="646331"/>
+            <a:off x="13929045" y="16791501"/>
+            <a:ext cx="2022038" cy="646331"/>
           </a:xfrm>
           <a:prstGeom prst="rect">
             <a:avLst/>
@@ -6220,7 +6219,7 @@
           <a:lstStyle/>
           <a:p>
             <a:r>
-              <a:rPr lang="nl-NL" sz="3600" b="1" dirty="0" smtClean="0">
+              <a:rPr lang="nl-NL" sz="3600" b="1" smtClean="0">
                 <a:solidFill>
                   <a:srgbClr val="003F77"/>
                 </a:solidFill>
@@ -6228,7 +6227,7 @@
                 <a:ea typeface="Avenir Next" charset="0"/>
                 <a:cs typeface="Avenir Next" charset="0"/>
               </a:rPr>
-              <a:t>Prune</a:t>
+              <a:t>Snoeien</a:t>
             </a:r>
             <a:endParaRPr lang="nl-NL" b="1" dirty="0">
               <a:solidFill>
@@ -6241,6 +6240,171 @@
           </a:p>
         </p:txBody>
       </p:sp>
+      <p:pic>
+        <p:nvPicPr>
+          <p:cNvPr id="29" name="Afbeelding 28"/>
+          <p:cNvPicPr>
+            <a:picLocks noChangeAspect="1"/>
+          </p:cNvPicPr>
+          <p:nvPr/>
+        </p:nvPicPr>
+        <p:blipFill>
+          <a:blip r:embed="rId6">
+            <a:extLst>
+              <a:ext uri="{28A0092B-C50C-407E-A947-70E740481C1C}">
+                <a14:useLocalDpi xmlns:a14="http://schemas.microsoft.com/office/drawing/2010/main" val="0"/>
+              </a:ext>
+            </a:extLst>
+          </a:blip>
+          <a:stretch>
+            <a:fillRect/>
+          </a:stretch>
+        </p:blipFill>
+        <p:spPr>
+          <a:xfrm>
+            <a:off x="26029079" y="13968746"/>
+            <a:ext cx="3155068" cy="2994850"/>
+          </a:xfrm>
+          <a:prstGeom prst="rect">
+            <a:avLst/>
+          </a:prstGeom>
+        </p:spPr>
+      </p:pic>
+      <p:pic>
+        <p:nvPicPr>
+          <p:cNvPr id="30" name="Afbeelding 29"/>
+          <p:cNvPicPr>
+            <a:picLocks noChangeAspect="1"/>
+          </p:cNvPicPr>
+          <p:nvPr/>
+        </p:nvPicPr>
+        <p:blipFill>
+          <a:blip r:embed="rId7">
+            <a:extLst>
+              <a:ext uri="{BEBA8EAE-BF5A-486C-A8C5-ECC9F3942E4B}">
+                <a14:imgProps xmlns:a14="http://schemas.microsoft.com/office/drawing/2010/main">
+                  <a14:imgLayer r:embed="rId8">
+                    <a14:imgEffect>
+                      <a14:backgroundRemoval t="0" b="100000" l="0" r="100000">
+                        <a14:foregroundMark x1="27000" y1="42200" x2="27000" y2="42200"/>
+                        <a14:foregroundMark x1="26600" y1="45800" x2="33400" y2="43000"/>
+                        <a14:foregroundMark x1="31400" y1="50200" x2="32600" y2="49800"/>
+                        <a14:foregroundMark x1="44600" y1="48200" x2="46600" y2="48600"/>
+                        <a14:foregroundMark x1="53400" y1="41800" x2="61400" y2="51800"/>
+                      </a14:backgroundRemoval>
+                    </a14:imgEffect>
+                  </a14:imgLayer>
+                </a14:imgProps>
+              </a:ext>
+              <a:ext uri="{28A0092B-C50C-407E-A947-70E740481C1C}">
+                <a14:useLocalDpi xmlns:a14="http://schemas.microsoft.com/office/drawing/2010/main" val="0"/>
+              </a:ext>
+            </a:extLst>
+          </a:blip>
+          <a:stretch>
+            <a:fillRect/>
+          </a:stretch>
+        </p:blipFill>
+        <p:spPr>
+          <a:xfrm>
+            <a:off x="998010" y="13953934"/>
+            <a:ext cx="2995200" cy="2995200"/>
+          </a:xfrm>
+          <a:prstGeom prst="rect">
+            <a:avLst/>
+          </a:prstGeom>
+        </p:spPr>
+      </p:pic>
+      <p:pic>
+        <p:nvPicPr>
+          <p:cNvPr id="37" name="Afbeelding 36"/>
+          <p:cNvPicPr>
+            <a:picLocks noChangeAspect="1"/>
+          </p:cNvPicPr>
+          <p:nvPr/>
+        </p:nvPicPr>
+        <p:blipFill>
+          <a:blip r:embed="rId9">
+            <a:extLst>
+              <a:ext uri="{28A0092B-C50C-407E-A947-70E740481C1C}">
+                <a14:useLocalDpi xmlns:a14="http://schemas.microsoft.com/office/drawing/2010/main" val="0"/>
+              </a:ext>
+            </a:extLst>
+          </a:blip>
+          <a:stretch>
+            <a:fillRect/>
+          </a:stretch>
+        </p:blipFill>
+        <p:spPr>
+          <a:xfrm>
+            <a:off x="3262538" y="32152964"/>
+            <a:ext cx="9040692" cy="4320000"/>
+          </a:xfrm>
+          <a:prstGeom prst="rect">
+            <a:avLst/>
+          </a:prstGeom>
+        </p:spPr>
+      </p:pic>
+      <p:pic>
+        <p:nvPicPr>
+          <p:cNvPr id="38" name="Afbeelding 37"/>
+          <p:cNvPicPr>
+            <a:picLocks noChangeAspect="1"/>
+          </p:cNvPicPr>
+          <p:nvPr/>
+        </p:nvPicPr>
+        <p:blipFill>
+          <a:blip r:embed="rId10">
+            <a:extLst>
+              <a:ext uri="{28A0092B-C50C-407E-A947-70E740481C1C}">
+                <a14:useLocalDpi xmlns:a14="http://schemas.microsoft.com/office/drawing/2010/main" val="0"/>
+              </a:ext>
+            </a:extLst>
+          </a:blip>
+          <a:stretch>
+            <a:fillRect/>
+          </a:stretch>
+        </p:blipFill>
+        <p:spPr>
+          <a:xfrm>
+            <a:off x="2168072" y="23789544"/>
+            <a:ext cx="5400000" cy="2420687"/>
+          </a:xfrm>
+          <a:prstGeom prst="rect">
+            <a:avLst/>
+          </a:prstGeom>
+        </p:spPr>
+      </p:pic>
+      <p:pic>
+        <p:nvPicPr>
+          <p:cNvPr id="39" name="Afbeelding 38"/>
+          <p:cNvPicPr>
+            <a:picLocks noChangeAspect="1"/>
+          </p:cNvPicPr>
+          <p:nvPr/>
+        </p:nvPicPr>
+        <p:blipFill>
+          <a:blip r:embed="rId11">
+            <a:extLst>
+              <a:ext uri="{28A0092B-C50C-407E-A947-70E740481C1C}">
+                <a14:useLocalDpi xmlns:a14="http://schemas.microsoft.com/office/drawing/2010/main" val="0"/>
+              </a:ext>
+            </a:extLst>
+          </a:blip>
+          <a:stretch>
+            <a:fillRect/>
+          </a:stretch>
+        </p:blipFill>
+        <p:spPr>
+          <a:xfrm>
+            <a:off x="8682884" y="24831511"/>
+            <a:ext cx="5400000" cy="2420690"/>
+          </a:xfrm>
+          <a:prstGeom prst="rect">
+            <a:avLst/>
+          </a:prstGeom>
+        </p:spPr>
+      </p:pic>
     </p:spTree>
   </p:cSld>
   <p:clrMapOvr>

</xml_diff>

<commit_message>
Added updated version of Poster
</commit_message>
<xml_diff>
--- a/Poster/Poster_herwerking.pptx
+++ b/Poster/Poster_herwerking.pptx
@@ -4909,7 +4909,7 @@
         <p:spPr>
           <a:xfrm>
             <a:off x="1724984" y="4426857"/>
-            <a:ext cx="11700000" cy="10033516"/>
+            <a:ext cx="11700000" cy="9987349"/>
           </a:xfrm>
           <a:prstGeom prst="rect">
             <a:avLst/>
@@ -4946,15 +4946,7 @@
                 <a:ea typeface="Avenir Next" charset="0"/>
                 <a:cs typeface="Avenir Next" charset="0"/>
               </a:rPr>
-              <a:t>Sorteernetwerken zorgen voor een klassiek formeel model voor de 	presentatie van enkele sorteeralgoritmen. Door onderzoek naar deze sorteernetwerpen kunnen mogelijke inzichten ontstaan over sorteerproblemen. Zo hebben </a:t>
-            </a:r>
-            <a:r>
-              <a:rPr lang="nl-NL" sz="3600" dirty="0" err="1" smtClean="0">
-                <a:latin typeface="Avenir Next" charset="0"/>
-                <a:ea typeface="Avenir Next" charset="0"/>
-                <a:cs typeface="Avenir Next" charset="0"/>
-              </a:rPr>
-              <a:t>Codish</a:t>
+              <a:t>Sorteernetwerken zorgen voor een klassiek formeel model voor de 	presentatie van enkele </a:t>
             </a:r>
             <a:r>
               <a:rPr lang="nl-NL" sz="3600" dirty="0" smtClean="0">
@@ -4962,7 +4954,71 @@
                 <a:ea typeface="Avenir Next" charset="0"/>
                 <a:cs typeface="Avenir Next" charset="0"/>
               </a:rPr>
-              <a:t> </a:t>
+              <a:t>sorteer-algoritmen</a:t>
+            </a:r>
+            <a:r>
+              <a:rPr lang="nl-NL" sz="3600" dirty="0" smtClean="0">
+                <a:latin typeface="Avenir Next" charset="0"/>
+                <a:ea typeface="Avenir Next" charset="0"/>
+                <a:cs typeface="Avenir Next" charset="0"/>
+              </a:rPr>
+              <a:t>. </a:t>
+            </a:r>
+            <a:r>
+              <a:rPr lang="nl-NL" sz="3600" dirty="0">
+                <a:latin typeface="Avenir Next" charset="0"/>
+                <a:ea typeface="Avenir Next" charset="0"/>
+                <a:cs typeface="Avenir Next" charset="0"/>
+              </a:rPr>
+              <a:t>O</a:t>
+            </a:r>
+            <a:r>
+              <a:rPr lang="nl-NL" sz="3600" dirty="0" smtClean="0">
+                <a:latin typeface="Avenir Next" charset="0"/>
+                <a:ea typeface="Avenir Next" charset="0"/>
+                <a:cs typeface="Avenir Next" charset="0"/>
+              </a:rPr>
+              <a:t>nderzoek </a:t>
+            </a:r>
+            <a:r>
+              <a:rPr lang="nl-NL" sz="3600" dirty="0" smtClean="0">
+                <a:latin typeface="Avenir Next" charset="0"/>
+                <a:ea typeface="Avenir Next" charset="0"/>
+                <a:cs typeface="Avenir Next" charset="0"/>
+              </a:rPr>
+              <a:t>naar deze </a:t>
+            </a:r>
+            <a:r>
+              <a:rPr lang="nl-NL" sz="3600" dirty="0" smtClean="0">
+                <a:latin typeface="Avenir Next" charset="0"/>
+                <a:ea typeface="Avenir Next" charset="0"/>
+                <a:cs typeface="Avenir Next" charset="0"/>
+              </a:rPr>
+              <a:t>sorteernetwerken kunnen tot </a:t>
+            </a:r>
+            <a:r>
+              <a:rPr lang="nl-NL" sz="3600" dirty="0" smtClean="0">
+                <a:latin typeface="Avenir Next" charset="0"/>
+                <a:ea typeface="Avenir Next" charset="0"/>
+                <a:cs typeface="Avenir Next" charset="0"/>
+              </a:rPr>
+              <a:t>mogelijke inzichten </a:t>
+            </a:r>
+            <a:r>
+              <a:rPr lang="nl-NL" sz="3600" dirty="0" smtClean="0">
+                <a:latin typeface="Avenir Next" charset="0"/>
+                <a:ea typeface="Avenir Next" charset="0"/>
+                <a:cs typeface="Avenir Next" charset="0"/>
+              </a:rPr>
+              <a:t>leiden. </a:t>
+            </a:r>
+            <a:r>
+              <a:rPr lang="nl-NL" sz="3600" dirty="0" smtClean="0">
+                <a:latin typeface="Avenir Next" charset="0"/>
+                <a:ea typeface="Avenir Next" charset="0"/>
+                <a:cs typeface="Avenir Next" charset="0"/>
+              </a:rPr>
+              <a:t>Zo hebben Codish </a:t>
             </a:r>
             <a:r>
               <a:rPr lang="nl-NL" sz="3600" i="1" dirty="0" smtClean="0">
@@ -4970,7 +5026,23 @@
                 <a:ea typeface="Avenir Next" charset="0"/>
                 <a:cs typeface="Avenir Next" charset="0"/>
               </a:rPr>
-              <a:t>et al.</a:t>
+              <a:t>et al</a:t>
+            </a:r>
+            <a:r>
+              <a:rPr lang="nl-NL" sz="3600" i="1" dirty="0" smtClean="0">
+                <a:latin typeface="Avenir Next" charset="0"/>
+                <a:ea typeface="Avenir Next" charset="0"/>
+                <a:cs typeface="Avenir Next" charset="0"/>
+              </a:rPr>
+              <a:t>.</a:t>
+            </a:r>
+            <a:r>
+              <a:rPr lang="nl-NL" sz="3600" dirty="0">
+                <a:latin typeface="Avenir Next" charset="0"/>
+                <a:ea typeface="Avenir Next" charset="0"/>
+                <a:cs typeface="Avenir Next" charset="0"/>
+              </a:rPr>
+              <a:t> </a:t>
             </a:r>
             <a:r>
               <a:rPr lang="nl-NL" sz="3600" dirty="0" smtClean="0">
@@ -4978,8 +5050,69 @@
                 <a:ea typeface="Avenir Next" charset="0"/>
                 <a:cs typeface="Avenir Next" charset="0"/>
               </a:rPr>
-              <a:t> [1] aangetoond, via sorteernetwerken, dat het sorteren van 9 elementen een minimum van 25 vergelijkingen (comparatoren) vereist. Dit onderzoek 	bouwt hierop verder.</a:t>
-            </a:r>
+              <a:t>[</a:t>
+            </a:r>
+            <a:r>
+              <a:rPr lang="nl-NL" sz="3600" dirty="0" smtClean="0">
+                <a:latin typeface="Avenir Next" charset="0"/>
+                <a:ea typeface="Avenir Next" charset="0"/>
+                <a:cs typeface="Avenir Next" charset="0"/>
+              </a:rPr>
+              <a:t>1] </a:t>
+            </a:r>
+            <a:r>
+              <a:rPr lang="nl-NL" sz="3600" dirty="0" smtClean="0">
+                <a:latin typeface="Avenir Next" charset="0"/>
+                <a:ea typeface="Avenir Next" charset="0"/>
+                <a:cs typeface="Avenir Next" charset="0"/>
+              </a:rPr>
+              <a:t>aangetoond dat </a:t>
+            </a:r>
+            <a:r>
+              <a:rPr lang="nl-NL" sz="3600" dirty="0" smtClean="0">
+                <a:latin typeface="Avenir Next" charset="0"/>
+                <a:ea typeface="Avenir Next" charset="0"/>
+                <a:cs typeface="Avenir Next" charset="0"/>
+              </a:rPr>
+              <a:t>het sorteren van </a:t>
+            </a:r>
+            <a:r>
+              <a:rPr lang="nl-NL" sz="3600" dirty="0" smtClean="0">
+                <a:latin typeface="Avenir Next" charset="0"/>
+                <a:ea typeface="Avenir Next" charset="0"/>
+                <a:cs typeface="Avenir Next" charset="0"/>
+              </a:rPr>
+              <a:t>9 elementen </a:t>
+            </a:r>
+            <a:r>
+              <a:rPr lang="nl-NL" sz="3600" dirty="0" smtClean="0">
+                <a:latin typeface="Avenir Next" charset="0"/>
+                <a:ea typeface="Avenir Next" charset="0"/>
+                <a:cs typeface="Avenir Next" charset="0"/>
+              </a:rPr>
+              <a:t>een minimum van 25 vergelijkingen (</a:t>
+            </a:r>
+            <a:r>
+              <a:rPr lang="nl-NL" sz="3600" dirty="0" smtClean="0">
+                <a:latin typeface="Avenir Next" charset="0"/>
+                <a:ea typeface="Avenir Next" charset="0"/>
+                <a:cs typeface="Avenir Next" charset="0"/>
+              </a:rPr>
+              <a:t>comparatoren</a:t>
+            </a:r>
+            <a:r>
+              <a:rPr lang="nl-NL" sz="3600" dirty="0" smtClean="0">
+                <a:latin typeface="Avenir Next" charset="0"/>
+                <a:ea typeface="Avenir Next" charset="0"/>
+                <a:cs typeface="Avenir Next" charset="0"/>
+              </a:rPr>
+              <a:t>) vereist. </a:t>
+            </a:r>
+            <a:endParaRPr lang="nl-NL" sz="3600" dirty="0">
+              <a:latin typeface="Avenir Next" charset="0"/>
+              <a:ea typeface="Avenir Next" charset="0"/>
+              <a:cs typeface="Avenir Next" charset="0"/>
+            </a:endParaRPr>
           </a:p>
           <a:p>
             <a:pPr algn="just"/>
@@ -4989,11 +5122,78 @@
                 <a:ea typeface="Avenir Next" charset="0"/>
                 <a:cs typeface="Avenir Next" charset="0"/>
               </a:rPr>
-              <a:t>Het doel bestaat erin</a:t>
-            </a:r>
+              <a:t>Dit </a:t>
+            </a:r>
+            <a:r>
+              <a:rPr lang="nl-NL" sz="3600" dirty="0" smtClean="0">
+                <a:latin typeface="Avenir Next" charset="0"/>
+                <a:ea typeface="Avenir Next" charset="0"/>
+                <a:cs typeface="Avenir Next" charset="0"/>
+              </a:rPr>
+              <a:t>onderzoek </a:t>
+            </a:r>
+            <a:r>
+              <a:rPr lang="nl-NL" sz="3600" dirty="0" smtClean="0">
+                <a:latin typeface="Avenir Next" charset="0"/>
+                <a:ea typeface="Avenir Next" charset="0"/>
+                <a:cs typeface="Avenir Next" charset="0"/>
+              </a:rPr>
+              <a:t>bouwt </a:t>
+            </a:r>
+            <a:r>
+              <a:rPr lang="nl-NL" sz="3600" dirty="0" smtClean="0">
+                <a:latin typeface="Avenir Next" charset="0"/>
+                <a:ea typeface="Avenir Next" charset="0"/>
+                <a:cs typeface="Avenir Next" charset="0"/>
+              </a:rPr>
+              <a:t>hierop verder</a:t>
+            </a:r>
+            <a:r>
+              <a:rPr lang="nl-NL" sz="3600" dirty="0" smtClean="0">
+                <a:latin typeface="Avenir Next" charset="0"/>
+                <a:ea typeface="Avenir Next" charset="0"/>
+                <a:cs typeface="Avenir Next" charset="0"/>
+              </a:rPr>
+              <a:t>.</a:t>
+            </a:r>
+          </a:p>
+          <a:p>
+            <a:pPr algn="just"/>
+            <a:endParaRPr lang="nl-NL" sz="3600" dirty="0" smtClean="0">
+              <a:latin typeface="Avenir Next" charset="0"/>
+              <a:ea typeface="Avenir Next" charset="0"/>
+              <a:cs typeface="Avenir Next" charset="0"/>
+            </a:endParaRPr>
+          </a:p>
+          <a:p>
+            <a:pPr algn="just"/>
+            <a:r>
+              <a:rPr lang="nl-NL" sz="3600" dirty="0" smtClean="0">
+                <a:latin typeface="Avenir Next" charset="0"/>
+                <a:ea typeface="Avenir Next" charset="0"/>
+                <a:cs typeface="Avenir Next" charset="0"/>
+              </a:rPr>
+              <a:t>Het doel bestaat </a:t>
+            </a:r>
+            <a:r>
+              <a:rPr lang="nl-NL" sz="3600" dirty="0" smtClean="0">
+                <a:latin typeface="Avenir Next" charset="0"/>
+                <a:ea typeface="Avenir Next" charset="0"/>
+                <a:cs typeface="Avenir Next" charset="0"/>
+              </a:rPr>
+              <a:t>erin</a:t>
+            </a:r>
+            <a:endParaRPr lang="nl-NL" sz="3600" dirty="0" smtClean="0">
+              <a:latin typeface="Avenir Next" charset="0"/>
+              <a:ea typeface="Avenir Next" charset="0"/>
+              <a:cs typeface="Avenir Next" charset="0"/>
+            </a:endParaRPr>
           </a:p>
           <a:p>
             <a:pPr marL="571500" indent="-571500" algn="just">
+              <a:lnSpc>
+                <a:spcPct val="150000"/>
+              </a:lnSpc>
               <a:buFont typeface="Arial" charset="0"/>
               <a:buChar char="•"/>
             </a:pPr>
@@ -5011,15 +5211,15 @@
                 <a:ea typeface="Avenir Next" charset="0"/>
                 <a:cs typeface="Avenir Next" charset="0"/>
               </a:rPr>
-              <a:t>e resultaten van </a:t>
-            </a:r>
-            <a:r>
-              <a:rPr lang="nl-NL" sz="3600" dirty="0" err="1" smtClean="0">
-                <a:latin typeface="Avenir Next" charset="0"/>
-                <a:ea typeface="Avenir Next" charset="0"/>
-                <a:cs typeface="Avenir Next" charset="0"/>
-              </a:rPr>
-              <a:t>Codish</a:t>
+              <a:t>e resultaten van Codish </a:t>
+            </a:r>
+            <a:r>
+              <a:rPr lang="nl-NL" sz="3600" i="1" dirty="0" smtClean="0">
+                <a:latin typeface="Avenir Next" charset="0"/>
+                <a:ea typeface="Avenir Next" charset="0"/>
+                <a:cs typeface="Avenir Next" charset="0"/>
+              </a:rPr>
+              <a:t>et al. </a:t>
             </a:r>
             <a:r>
               <a:rPr lang="nl-NL" sz="3600" dirty="0" smtClean="0">
@@ -5027,11 +5227,43 @@
                 <a:ea typeface="Avenir Next" charset="0"/>
                 <a:cs typeface="Avenir Next" charset="0"/>
               </a:rPr>
-              <a:t> et al. [1] voor een sorteernetwerk van 9 kanalen en 25 comparatoren te reproduceren.</a:t>
-            </a:r>
+              <a:t>[1] </a:t>
+            </a:r>
+            <a:r>
+              <a:rPr lang="nl-NL" sz="3600" dirty="0" smtClean="0">
+                <a:latin typeface="Avenir Next" charset="0"/>
+                <a:ea typeface="Avenir Next" charset="0"/>
+                <a:cs typeface="Avenir Next" charset="0"/>
+              </a:rPr>
+              <a:t>te </a:t>
+            </a:r>
+            <a:r>
+              <a:rPr lang="nl-NL" sz="3600" dirty="0" smtClean="0">
+                <a:latin typeface="Avenir Next" charset="0"/>
+                <a:ea typeface="Avenir Next" charset="0"/>
+                <a:cs typeface="Avenir Next" charset="0"/>
+              </a:rPr>
+              <a:t>reproduceren</a:t>
+            </a:r>
+            <a:r>
+              <a:rPr lang="nl-NL" sz="3600" dirty="0" smtClean="0">
+                <a:latin typeface="Avenir Next" charset="0"/>
+                <a:ea typeface="Avenir Next" charset="0"/>
+                <a:cs typeface="Avenir Next" charset="0"/>
+              </a:rPr>
+              <a:t>.</a:t>
+            </a:r>
+            <a:endParaRPr lang="nl-NL" sz="3600" dirty="0" smtClean="0">
+              <a:latin typeface="Avenir Next" charset="0"/>
+              <a:ea typeface="Avenir Next" charset="0"/>
+              <a:cs typeface="Avenir Next" charset="0"/>
+            </a:endParaRPr>
           </a:p>
           <a:p>
             <a:pPr marL="571500" indent="-571500" algn="just">
+              <a:spcBef>
+                <a:spcPts val="1800"/>
+              </a:spcBef>
               <a:buFont typeface="Arial" charset="0"/>
               <a:buChar char="•"/>
             </a:pPr>
@@ -5049,8 +5281,28 @@
                 <a:ea typeface="Avenir Next" charset="0"/>
                 <a:cs typeface="Avenir Next" charset="0"/>
               </a:rPr>
-              <a:t>e methode te verbeteren om een sorteernetwerk voor 11 kanalen te bekomen met optimale grootte.</a:t>
-            </a:r>
+              <a:t>e methode te verbeteren om een sorteernetwerk voor 11 kanalen te bekomen met optimale grootte</a:t>
+            </a:r>
+            <a:r>
+              <a:rPr lang="nl-NL" sz="3600" dirty="0" smtClean="0">
+                <a:latin typeface="Avenir Next" charset="0"/>
+                <a:ea typeface="Avenir Next" charset="0"/>
+                <a:cs typeface="Avenir Next" charset="0"/>
+              </a:rPr>
+              <a:t>.</a:t>
+            </a:r>
+            <a:br>
+              <a:rPr lang="nl-NL" sz="3600" dirty="0" smtClean="0">
+                <a:latin typeface="Avenir Next" charset="0"/>
+                <a:ea typeface="Avenir Next" charset="0"/>
+                <a:cs typeface="Avenir Next" charset="0"/>
+              </a:rPr>
+            </a:br>
+            <a:endParaRPr lang="nl-NL" sz="3600" dirty="0" smtClean="0">
+              <a:latin typeface="Avenir Next" charset="0"/>
+              <a:ea typeface="Avenir Next" charset="0"/>
+              <a:cs typeface="Avenir Next" charset="0"/>
+            </a:endParaRPr>
           </a:p>
           <a:p>
             <a:pPr marL="571500" indent="-571500" algn="just">
@@ -5250,6 +5502,14 @@
           </a:p>
           <a:p>
             <a:pPr algn="just"/>
+            <a:endParaRPr lang="nl-NL" sz="3600" dirty="0" smtClean="0">
+              <a:latin typeface="Avenir Next" charset="0"/>
+              <a:ea typeface="Avenir Next" charset="0"/>
+              <a:cs typeface="Avenir Next" charset="0"/>
+            </a:endParaRPr>
+          </a:p>
+          <a:p>
+            <a:pPr algn="just"/>
             <a:endParaRPr lang="nl-NL" sz="3600" dirty="0">
               <a:latin typeface="Avenir Next" charset="0"/>
               <a:ea typeface="Avenir Next" charset="0"/>
@@ -5266,15 +5526,7 @@
           </a:p>
           <a:p>
             <a:pPr algn="just"/>
-            <a:r>
-              <a:rPr lang="nl-NL" sz="4000" b="1" dirty="0" smtClean="0">
-                <a:latin typeface="Avenir Next" charset="0"/>
-                <a:ea typeface="Avenir Next" charset="0"/>
-                <a:cs typeface="Avenir Next" charset="0"/>
-              </a:rPr>
-              <a:t>Comparator</a:t>
-            </a:r>
-            <a:endParaRPr lang="nl-NL" sz="4000" b="1" dirty="0" smtClean="0">
+            <a:endParaRPr lang="nl-NL" sz="3600" dirty="0" smtClean="0">
               <a:latin typeface="Avenir Next" charset="0"/>
               <a:ea typeface="Avenir Next" charset="0"/>
               <a:cs typeface="Avenir Next" charset="0"/>
@@ -5282,14 +5534,11 @@
           </a:p>
           <a:p>
             <a:pPr algn="just"/>
-            <a:r>
-              <a:rPr lang="nl-NL" sz="3600" dirty="0" smtClean="0">
-                <a:latin typeface="Avenir Next" charset="0"/>
-                <a:ea typeface="Avenir Next" charset="0"/>
-                <a:cs typeface="Avenir Next" charset="0"/>
-              </a:rPr>
-              <a:t>Een comparator neemt de input verkregen door twee verbonden kanalen en geeft de waarden in gesorteerde volgorde terug.</a:t>
-            </a:r>
+            <a:endParaRPr lang="nl-NL" sz="3600" dirty="0">
+              <a:latin typeface="Avenir Next" charset="0"/>
+              <a:ea typeface="Avenir Next" charset="0"/>
+              <a:cs typeface="Avenir Next" charset="0"/>
+            </a:endParaRPr>
           </a:p>
           <a:p>
             <a:pPr algn="just"/>
@@ -5301,7 +5550,15 @@
           </a:p>
           <a:p>
             <a:pPr algn="just"/>
-            <a:endParaRPr lang="nl-NL" sz="3600" dirty="0">
+            <a:r>
+              <a:rPr lang="nl-NL" sz="4000" b="1" dirty="0" smtClean="0">
+                <a:latin typeface="Avenir Next" charset="0"/>
+                <a:ea typeface="Avenir Next" charset="0"/>
+                <a:cs typeface="Avenir Next" charset="0"/>
+              </a:rPr>
+              <a:t>Comparator</a:t>
+            </a:r>
+            <a:endParaRPr lang="nl-NL" sz="4000" b="1" dirty="0" smtClean="0">
               <a:latin typeface="Avenir Next" charset="0"/>
               <a:ea typeface="Avenir Next" charset="0"/>
               <a:cs typeface="Avenir Next" charset="0"/>
@@ -5309,19 +5566,14 @@
           </a:p>
           <a:p>
             <a:pPr algn="just"/>
-            <a:endParaRPr lang="nl-NL" sz="3600" dirty="0" smtClean="0">
-              <a:latin typeface="Avenir Next" charset="0"/>
-              <a:ea typeface="Avenir Next" charset="0"/>
-              <a:cs typeface="Avenir Next" charset="0"/>
-            </a:endParaRPr>
-          </a:p>
-          <a:p>
-            <a:pPr algn="just"/>
-            <a:endParaRPr lang="nl-NL" sz="3600" dirty="0">
-              <a:latin typeface="Avenir Next" charset="0"/>
-              <a:ea typeface="Avenir Next" charset="0"/>
-              <a:cs typeface="Avenir Next" charset="0"/>
-            </a:endParaRPr>
+            <a:r>
+              <a:rPr lang="nl-NL" sz="3600" dirty="0" smtClean="0">
+                <a:latin typeface="Avenir Next" charset="0"/>
+                <a:ea typeface="Avenir Next" charset="0"/>
+                <a:cs typeface="Avenir Next" charset="0"/>
+              </a:rPr>
+              <a:t>Een comparator neemt de input verkregen door twee verbonden kanalen en geeft de waarden in gesorteerde volgorde terug.</a:t>
+            </a:r>
           </a:p>
           <a:p>
             <a:pPr algn="just"/>
@@ -5542,15 +5794,7 @@
                 <a:ea typeface="Avenir Next" charset="0"/>
                 <a:cs typeface="Avenir Next" charset="0"/>
               </a:rPr>
-              <a:t>	Sorteernetwerken zorgen voor een klassiek formeel model voor de 	presentatie van enkele sorteeralgoritmen. Door onderzoek naar deze sorteernetwerpen kunnen mogelijke inzichten ontstaan over sorteerproblemen. Zo hebben </a:t>
-            </a:r>
-            <a:r>
-              <a:rPr lang="nl-NL" sz="3600" dirty="0" err="1" smtClean="0">
-                <a:latin typeface="Avenir Next" charset="0"/>
-                <a:ea typeface="Avenir Next" charset="0"/>
-                <a:cs typeface="Avenir Next" charset="0"/>
-              </a:rPr>
-              <a:t>Codish</a:t>
+              <a:t>	</a:t>
             </a:r>
             <a:r>
               <a:rPr lang="nl-NL" sz="3600" dirty="0" smtClean="0">
@@ -5558,8 +5802,72 @@
                 <a:ea typeface="Avenir Next" charset="0"/>
                 <a:cs typeface="Avenir Next" charset="0"/>
               </a:rPr>
-              <a:t> et al. [1] aangetoond, via sorteernetwerken, dat het sorteren van 9 elementen een minimum van 25 vergelijkingen (comparatoren) vereist. Dit onderzoek 	bouwt hierop verder.</a:t>
-            </a:r>
+              <a:t>Dit is een testtekstje</a:t>
+            </a:r>
+          </a:p>
+          <a:p>
+            <a:pPr algn="just"/>
+            <a:endParaRPr lang="nl-NL" sz="3600" dirty="0">
+              <a:latin typeface="Avenir Next" charset="0"/>
+              <a:ea typeface="Avenir Next" charset="0"/>
+              <a:cs typeface="Avenir Next" charset="0"/>
+            </a:endParaRPr>
+          </a:p>
+          <a:p>
+            <a:pPr algn="just"/>
+            <a:endParaRPr lang="nl-NL" sz="3600" dirty="0" smtClean="0">
+              <a:latin typeface="Avenir Next" charset="0"/>
+              <a:ea typeface="Avenir Next" charset="0"/>
+              <a:cs typeface="Avenir Next" charset="0"/>
+            </a:endParaRPr>
+          </a:p>
+          <a:p>
+            <a:pPr algn="just"/>
+            <a:endParaRPr lang="nl-NL" sz="3600" dirty="0">
+              <a:latin typeface="Avenir Next" charset="0"/>
+              <a:ea typeface="Avenir Next" charset="0"/>
+              <a:cs typeface="Avenir Next" charset="0"/>
+            </a:endParaRPr>
+          </a:p>
+          <a:p>
+            <a:pPr algn="just"/>
+            <a:endParaRPr lang="nl-NL" sz="3600" dirty="0" smtClean="0">
+              <a:latin typeface="Avenir Next" charset="0"/>
+              <a:ea typeface="Avenir Next" charset="0"/>
+              <a:cs typeface="Avenir Next" charset="0"/>
+            </a:endParaRPr>
+          </a:p>
+          <a:p>
+            <a:pPr algn="just"/>
+            <a:endParaRPr lang="nl-NL" sz="3600" dirty="0">
+              <a:latin typeface="Avenir Next" charset="0"/>
+              <a:ea typeface="Avenir Next" charset="0"/>
+              <a:cs typeface="Avenir Next" charset="0"/>
+            </a:endParaRPr>
+          </a:p>
+          <a:p>
+            <a:pPr algn="just"/>
+            <a:endParaRPr lang="nl-NL" sz="3600" dirty="0" smtClean="0">
+              <a:latin typeface="Avenir Next" charset="0"/>
+              <a:ea typeface="Avenir Next" charset="0"/>
+              <a:cs typeface="Avenir Next" charset="0"/>
+            </a:endParaRPr>
+          </a:p>
+          <a:p>
+            <a:pPr algn="just"/>
+            <a:endParaRPr lang="nl-NL" sz="3600" dirty="0">
+              <a:latin typeface="Avenir Next" charset="0"/>
+              <a:ea typeface="Avenir Next" charset="0"/>
+              <a:cs typeface="Avenir Next" charset="0"/>
+            </a:endParaRPr>
+          </a:p>
+          <a:p>
+            <a:pPr algn="just"/>
+            <a:endParaRPr lang="nl-NL" sz="3600" dirty="0" smtClean="0">
+              <a:latin typeface="Avenir Next" charset="0"/>
+              <a:ea typeface="Avenir Next" charset="0"/>
+              <a:cs typeface="Avenir Next" charset="0"/>
+            </a:endParaRPr>
           </a:p>
           <a:p>
             <a:pPr algn="just"/>
@@ -6367,7 +6675,7 @@
         </p:blipFill>
         <p:spPr>
           <a:xfrm>
-            <a:off x="2168072" y="23789544"/>
+            <a:off x="1877314" y="25768132"/>
             <a:ext cx="5400000" cy="2420687"/>
           </a:xfrm>
           <a:prstGeom prst="rect">
@@ -6397,7 +6705,7 @@
         </p:blipFill>
         <p:spPr>
           <a:xfrm>
-            <a:off x="8682884" y="24831511"/>
+            <a:off x="8005229" y="25759883"/>
             <a:ext cx="5400000" cy="2420690"/>
           </a:xfrm>
           <a:prstGeom prst="rect">
@@ -6405,6 +6713,168 @@
           </a:prstGeom>
         </p:spPr>
       </p:pic>
+      <p:pic>
+        <p:nvPicPr>
+          <p:cNvPr id="44" name="Afbeelding 43"/>
+          <p:cNvPicPr>
+            <a:picLocks noChangeAspect="1"/>
+          </p:cNvPicPr>
+          <p:nvPr/>
+        </p:nvPicPr>
+        <p:blipFill>
+          <a:blip r:embed="rId12">
+            <a:extLst>
+              <a:ext uri="{28A0092B-C50C-407E-A947-70E740481C1C}">
+                <a14:useLocalDpi xmlns:a14="http://schemas.microsoft.com/office/drawing/2010/main" val="0"/>
+              </a:ext>
+            </a:extLst>
+          </a:blip>
+          <a:stretch>
+            <a:fillRect/>
+          </a:stretch>
+        </p:blipFill>
+        <p:spPr>
+          <a:xfrm>
+            <a:off x="16825768" y="29425142"/>
+            <a:ext cx="10800000" cy="7054211"/>
+          </a:xfrm>
+          <a:prstGeom prst="rect">
+            <a:avLst/>
+          </a:prstGeom>
+        </p:spPr>
+      </p:pic>
+      <p:pic>
+        <p:nvPicPr>
+          <p:cNvPr id="45" name="Afbeelding 44"/>
+          <p:cNvPicPr>
+            <a:picLocks noChangeAspect="1"/>
+          </p:cNvPicPr>
+          <p:nvPr/>
+        </p:nvPicPr>
+        <p:blipFill>
+          <a:blip r:embed="rId13">
+            <a:extLst>
+              <a:ext uri="{28A0092B-C50C-407E-A947-70E740481C1C}">
+                <a14:useLocalDpi xmlns:a14="http://schemas.microsoft.com/office/drawing/2010/main" val="0"/>
+              </a:ext>
+            </a:extLst>
+          </a:blip>
+          <a:stretch>
+            <a:fillRect/>
+          </a:stretch>
+        </p:blipFill>
+        <p:spPr>
+          <a:xfrm>
+            <a:off x="16825768" y="20944511"/>
+            <a:ext cx="10800000" cy="7054211"/>
+          </a:xfrm>
+          <a:prstGeom prst="rect">
+            <a:avLst/>
+          </a:prstGeom>
+        </p:spPr>
+      </p:pic>
+      <p:pic>
+        <p:nvPicPr>
+          <p:cNvPr id="46" name="Afbeelding 45"/>
+          <p:cNvPicPr>
+            <a:picLocks noChangeAspect="1"/>
+          </p:cNvPicPr>
+          <p:nvPr/>
+        </p:nvPicPr>
+        <p:blipFill>
+          <a:blip r:embed="rId14">
+            <a:extLst>
+              <a:ext uri="{28A0092B-C50C-407E-A947-70E740481C1C}">
+                <a14:useLocalDpi xmlns:a14="http://schemas.microsoft.com/office/drawing/2010/main" val="0"/>
+              </a:ext>
+            </a:extLst>
+          </a:blip>
+          <a:stretch>
+            <a:fillRect/>
+          </a:stretch>
+        </p:blipFill>
+        <p:spPr>
+          <a:xfrm>
+            <a:off x="6093634" y="18606825"/>
+            <a:ext cx="5937943" cy="4755607"/>
+          </a:xfrm>
+          <a:prstGeom prst="rect">
+            <a:avLst/>
+          </a:prstGeom>
+        </p:spPr>
+      </p:pic>
+      <p:cxnSp>
+        <p:nvCxnSpPr>
+          <p:cNvPr id="48" name="Rechte verbindingslijn met pijl 47"/>
+          <p:cNvCxnSpPr/>
+          <p:nvPr/>
+        </p:nvCxnSpPr>
+        <p:spPr>
+          <a:xfrm>
+            <a:off x="3262538" y="18376554"/>
+            <a:ext cx="3163662" cy="2161411"/>
+          </a:xfrm>
+          <a:prstGeom prst="straightConnector1">
+            <a:avLst/>
+          </a:prstGeom>
+          <a:ln w="88900">
+            <a:solidFill>
+              <a:srgbClr val="003F77"/>
+            </a:solidFill>
+            <a:tailEnd type="triangle"/>
+          </a:ln>
+        </p:spPr>
+        <p:style>
+          <a:lnRef idx="2">
+            <a:schemeClr val="dk1"/>
+          </a:lnRef>
+          <a:fillRef idx="0">
+            <a:schemeClr val="dk1"/>
+          </a:fillRef>
+          <a:effectRef idx="1">
+            <a:schemeClr val="dk1"/>
+          </a:effectRef>
+          <a:fontRef idx="minor">
+            <a:schemeClr val="tx1"/>
+          </a:fontRef>
+        </p:style>
+      </p:cxnSp>
+      <p:cxnSp>
+        <p:nvCxnSpPr>
+          <p:cNvPr id="50" name="Rechte verbindingslijn met pijl 49"/>
+          <p:cNvCxnSpPr/>
+          <p:nvPr/>
+        </p:nvCxnSpPr>
+        <p:spPr>
+          <a:xfrm flipV="1">
+            <a:off x="4411579" y="22578596"/>
+            <a:ext cx="3593650" cy="669537"/>
+          </a:xfrm>
+          <a:prstGeom prst="straightConnector1">
+            <a:avLst/>
+          </a:prstGeom>
+          <a:ln w="88900">
+            <a:solidFill>
+              <a:srgbClr val="003F77"/>
+            </a:solidFill>
+            <a:tailEnd type="triangle"/>
+          </a:ln>
+        </p:spPr>
+        <p:style>
+          <a:lnRef idx="2">
+            <a:schemeClr val="dk1"/>
+          </a:lnRef>
+          <a:fillRef idx="0">
+            <a:schemeClr val="dk1"/>
+          </a:fillRef>
+          <a:effectRef idx="1">
+            <a:schemeClr val="dk1"/>
+          </a:effectRef>
+          <a:fontRef idx="minor">
+            <a:schemeClr val="tx1"/>
+          </a:fontRef>
+        </p:style>
+      </p:cxnSp>
     </p:spTree>
   </p:cSld>
   <p:clrMapOvr>

</xml_diff>

<commit_message>
Updated poster, almost ready
</commit_message>
<xml_diff>
--- a/Poster/Poster_herwerking.pptx
+++ b/Poster/Poster_herwerking.pptx
@@ -4892,7 +4892,7 @@
         </p:blipFill>
         <p:spPr>
           <a:xfrm>
-            <a:off x="22562749" y="39721073"/>
+            <a:off x="22545496" y="39686567"/>
             <a:ext cx="6350000" cy="2273300"/>
           </a:xfrm>
           <a:prstGeom prst="rect">
@@ -5757,7 +5757,7 @@
         <p:spPr>
           <a:xfrm>
             <a:off x="16167868" y="16682899"/>
-            <a:ext cx="12115800" cy="15665827"/>
+            <a:ext cx="12115800" cy="20159365"/>
           </a:xfrm>
           <a:prstGeom prst="rect">
             <a:avLst/>
@@ -5796,14 +5796,19 @@
               </a:rPr>
               <a:t>	</a:t>
             </a:r>
-            <a:r>
-              <a:rPr lang="nl-NL" sz="3600" dirty="0" smtClean="0">
-                <a:latin typeface="Avenir Next" charset="0"/>
-                <a:ea typeface="Avenir Next" charset="0"/>
-                <a:cs typeface="Avenir Next" charset="0"/>
-              </a:rPr>
-              <a:t>Dit is een testtekstje</a:t>
-            </a:r>
+            <a:endParaRPr lang="nl-NL" sz="3600" dirty="0">
+              <a:latin typeface="Avenir Next" charset="0"/>
+              <a:ea typeface="Avenir Next" charset="0"/>
+              <a:cs typeface="Avenir Next" charset="0"/>
+            </a:endParaRPr>
+          </a:p>
+          <a:p>
+            <a:pPr algn="just"/>
+            <a:endParaRPr lang="nl-NL" sz="3600" dirty="0" smtClean="0">
+              <a:latin typeface="Avenir Next" charset="0"/>
+              <a:ea typeface="Avenir Next" charset="0"/>
+              <a:cs typeface="Avenir Next" charset="0"/>
+            </a:endParaRPr>
           </a:p>
           <a:p>
             <a:pPr algn="just"/>
@@ -5855,6 +5860,14 @@
           </a:p>
           <a:p>
             <a:pPr algn="just"/>
+            <a:endParaRPr lang="nl-NL" sz="3600" dirty="0" smtClean="0">
+              <a:latin typeface="Avenir Next" charset="0"/>
+              <a:ea typeface="Avenir Next" charset="0"/>
+              <a:cs typeface="Avenir Next" charset="0"/>
+            </a:endParaRPr>
+          </a:p>
+          <a:p>
+            <a:pPr algn="just"/>
             <a:endParaRPr lang="nl-NL" sz="3600" dirty="0">
               <a:latin typeface="Avenir Next" charset="0"/>
               <a:ea typeface="Avenir Next" charset="0"/>
@@ -5871,6 +5884,14 @@
           </a:p>
           <a:p>
             <a:pPr algn="just"/>
+            <a:endParaRPr lang="nl-NL" sz="3600" dirty="0">
+              <a:latin typeface="Avenir Next" charset="0"/>
+              <a:ea typeface="Avenir Next" charset="0"/>
+              <a:cs typeface="Avenir Next" charset="0"/>
+            </a:endParaRPr>
+          </a:p>
+          <a:p>
+            <a:pPr algn="just"/>
             <a:endParaRPr lang="nl-NL" sz="3600" dirty="0" smtClean="0">
               <a:latin typeface="Avenir Next" charset="0"/>
               <a:ea typeface="Avenir Next" charset="0"/>
@@ -5903,6 +5924,134 @@
           </a:p>
           <a:p>
             <a:pPr algn="just"/>
+            <a:endParaRPr lang="nl-NL" sz="3600" dirty="0">
+              <a:latin typeface="Avenir Next" charset="0"/>
+              <a:ea typeface="Avenir Next" charset="0"/>
+              <a:cs typeface="Avenir Next" charset="0"/>
+            </a:endParaRPr>
+          </a:p>
+          <a:p>
+            <a:pPr algn="just"/>
+            <a:endParaRPr lang="nl-NL" sz="3600" dirty="0" smtClean="0">
+              <a:latin typeface="Avenir Next" charset="0"/>
+              <a:ea typeface="Avenir Next" charset="0"/>
+              <a:cs typeface="Avenir Next" charset="0"/>
+            </a:endParaRPr>
+          </a:p>
+          <a:p>
+            <a:pPr algn="just"/>
+            <a:endParaRPr lang="nl-NL" dirty="0" smtClean="0">
+              <a:latin typeface="Avenir Next" charset="0"/>
+              <a:ea typeface="Avenir Next" charset="0"/>
+              <a:cs typeface="Avenir Next" charset="0"/>
+            </a:endParaRPr>
+          </a:p>
+          <a:p>
+            <a:pPr algn="just"/>
+            <a:endParaRPr lang="nl-NL" dirty="0">
+              <a:latin typeface="Avenir Next" charset="0"/>
+              <a:ea typeface="Avenir Next" charset="0"/>
+              <a:cs typeface="Avenir Next" charset="0"/>
+            </a:endParaRPr>
+          </a:p>
+          <a:p>
+            <a:pPr algn="just"/>
+            <a:endParaRPr lang="nl-NL" dirty="0" smtClean="0">
+              <a:latin typeface="Avenir Next" charset="0"/>
+              <a:ea typeface="Avenir Next" charset="0"/>
+              <a:cs typeface="Avenir Next" charset="0"/>
+            </a:endParaRPr>
+          </a:p>
+          <a:p>
+            <a:pPr algn="just"/>
+            <a:endParaRPr lang="nl-NL" dirty="0">
+              <a:latin typeface="Avenir Next" charset="0"/>
+              <a:ea typeface="Avenir Next" charset="0"/>
+              <a:cs typeface="Avenir Next" charset="0"/>
+            </a:endParaRPr>
+          </a:p>
+          <a:p>
+            <a:pPr algn="just"/>
+            <a:endParaRPr lang="nl-NL" dirty="0" smtClean="0">
+              <a:latin typeface="Avenir Next" charset="0"/>
+              <a:ea typeface="Avenir Next" charset="0"/>
+              <a:cs typeface="Avenir Next" charset="0"/>
+            </a:endParaRPr>
+          </a:p>
+          <a:p>
+            <a:pPr algn="just"/>
+            <a:endParaRPr lang="nl-NL" dirty="0">
+              <a:latin typeface="Avenir Next" charset="0"/>
+              <a:ea typeface="Avenir Next" charset="0"/>
+              <a:cs typeface="Avenir Next" charset="0"/>
+            </a:endParaRPr>
+          </a:p>
+          <a:p>
+            <a:pPr algn="just"/>
+            <a:endParaRPr lang="nl-NL" dirty="0" smtClean="0">
+              <a:latin typeface="Avenir Next" charset="0"/>
+              <a:ea typeface="Avenir Next" charset="0"/>
+              <a:cs typeface="Avenir Next" charset="0"/>
+            </a:endParaRPr>
+          </a:p>
+          <a:p>
+            <a:pPr algn="just"/>
+            <a:endParaRPr lang="nl-NL" dirty="0">
+              <a:latin typeface="Avenir Next" charset="0"/>
+              <a:ea typeface="Avenir Next" charset="0"/>
+              <a:cs typeface="Avenir Next" charset="0"/>
+            </a:endParaRPr>
+          </a:p>
+          <a:p>
+            <a:pPr algn="just"/>
+            <a:endParaRPr lang="nl-NL" dirty="0" smtClean="0">
+              <a:latin typeface="Avenir Next" charset="0"/>
+              <a:ea typeface="Avenir Next" charset="0"/>
+              <a:cs typeface="Avenir Next" charset="0"/>
+            </a:endParaRPr>
+          </a:p>
+          <a:p>
+            <a:pPr algn="just"/>
+            <a:endParaRPr lang="nl-NL" dirty="0">
+              <a:latin typeface="Avenir Next" charset="0"/>
+              <a:ea typeface="Avenir Next" charset="0"/>
+              <a:cs typeface="Avenir Next" charset="0"/>
+            </a:endParaRPr>
+          </a:p>
+          <a:p>
+            <a:pPr algn="just"/>
+            <a:endParaRPr lang="nl-NL" dirty="0" smtClean="0">
+              <a:latin typeface="Avenir Next" charset="0"/>
+              <a:ea typeface="Avenir Next" charset="0"/>
+              <a:cs typeface="Avenir Next" charset="0"/>
+            </a:endParaRPr>
+          </a:p>
+          <a:p>
+            <a:pPr algn="just"/>
+            <a:endParaRPr lang="nl-NL" dirty="0">
+              <a:latin typeface="Avenir Next" charset="0"/>
+              <a:ea typeface="Avenir Next" charset="0"/>
+              <a:cs typeface="Avenir Next" charset="0"/>
+            </a:endParaRPr>
+          </a:p>
+          <a:p>
+            <a:pPr algn="just"/>
+            <a:r>
+              <a:rPr lang="nl-NL" sz="4200" b="1" dirty="0" smtClean="0">
+                <a:latin typeface="Avenir Next" charset="0"/>
+                <a:ea typeface="Avenir Next" charset="0"/>
+                <a:cs typeface="Avenir Next" charset="0"/>
+              </a:rPr>
+              <a:t>Conclusie</a:t>
+            </a:r>
+            <a:endParaRPr lang="nl-NL" sz="3600" dirty="0">
+              <a:latin typeface="Avenir Next" charset="0"/>
+              <a:ea typeface="Avenir Next" charset="0"/>
+              <a:cs typeface="Avenir Next" charset="0"/>
+            </a:endParaRPr>
+          </a:p>
+          <a:p>
+            <a:pPr algn="just"/>
             <a:endParaRPr lang="nl-NL" sz="3600" dirty="0" smtClean="0">
               <a:latin typeface="Avenir Next" charset="0"/>
               <a:ea typeface="Avenir Next" charset="0"/>
@@ -5927,15 +6076,7 @@
           </a:p>
           <a:p>
             <a:pPr algn="just"/>
-            <a:endParaRPr lang="nl-NL" sz="3600" dirty="0">
-              <a:latin typeface="Avenir Next" charset="0"/>
-              <a:ea typeface="Avenir Next" charset="0"/>
-              <a:cs typeface="Avenir Next" charset="0"/>
-            </a:endParaRPr>
-          </a:p>
-          <a:p>
-            <a:pPr algn="just"/>
-            <a:endParaRPr lang="nl-NL" sz="3600" dirty="0">
+            <a:endParaRPr lang="nl-NL" sz="3600" dirty="0" smtClean="0">
               <a:latin typeface="Avenir Next" charset="0"/>
               <a:ea typeface="Avenir Next" charset="0"/>
               <a:cs typeface="Avenir Next" charset="0"/>
@@ -5949,65 +6090,6 @@
               <a:cs typeface="Avenir Next" charset="0"/>
             </a:endParaRPr>
           </a:p>
-          <a:p>
-            <a:pPr algn="just"/>
-            <a:r>
-              <a:rPr lang="nl-NL" sz="4200" b="1" dirty="0" smtClean="0">
-                <a:latin typeface="Avenir Next" charset="0"/>
-                <a:ea typeface="Avenir Next" charset="0"/>
-                <a:cs typeface="Avenir Next" charset="0"/>
-              </a:rPr>
-              <a:t>Conclusie</a:t>
-            </a:r>
-          </a:p>
-          <a:p>
-            <a:pPr algn="just"/>
-            <a:endParaRPr lang="nl-NL" sz="3600" dirty="0">
-              <a:latin typeface="Avenir Next" charset="0"/>
-              <a:ea typeface="Avenir Next" charset="0"/>
-              <a:cs typeface="Avenir Next" charset="0"/>
-            </a:endParaRPr>
-          </a:p>
-          <a:p>
-            <a:pPr algn="just"/>
-            <a:endParaRPr lang="nl-NL" sz="3600" dirty="0" smtClean="0">
-              <a:latin typeface="Avenir Next" charset="0"/>
-              <a:ea typeface="Avenir Next" charset="0"/>
-              <a:cs typeface="Avenir Next" charset="0"/>
-            </a:endParaRPr>
-          </a:p>
-          <a:p>
-            <a:pPr algn="just"/>
-            <a:endParaRPr lang="nl-NL" sz="3600" dirty="0">
-              <a:latin typeface="Avenir Next" charset="0"/>
-              <a:ea typeface="Avenir Next" charset="0"/>
-              <a:cs typeface="Avenir Next" charset="0"/>
-            </a:endParaRPr>
-          </a:p>
-          <a:p>
-            <a:pPr algn="just"/>
-            <a:endParaRPr lang="nl-NL" sz="3600" dirty="0" smtClean="0">
-              <a:latin typeface="Avenir Next" charset="0"/>
-              <a:ea typeface="Avenir Next" charset="0"/>
-              <a:cs typeface="Avenir Next" charset="0"/>
-            </a:endParaRPr>
-          </a:p>
-          <a:p>
-            <a:pPr algn="just"/>
-            <a:endParaRPr lang="nl-NL" sz="3600" dirty="0" smtClean="0">
-              <a:latin typeface="Avenir Next" charset="0"/>
-              <a:ea typeface="Avenir Next" charset="0"/>
-              <a:cs typeface="Avenir Next" charset="0"/>
-            </a:endParaRPr>
-          </a:p>
-          <a:p>
-            <a:pPr algn="just"/>
-            <a:endParaRPr lang="nl-NL" sz="3600" dirty="0" smtClean="0">
-              <a:latin typeface="Avenir Next" charset="0"/>
-              <a:ea typeface="Avenir Next" charset="0"/>
-              <a:cs typeface="Avenir Next" charset="0"/>
-            </a:endParaRPr>
-          </a:p>
         </p:txBody>
       </p:sp>
       <p:sp>
@@ -6018,8 +6100,8 @@
         </p:nvSpPr>
         <p:spPr>
           <a:xfrm>
-            <a:off x="16167868" y="37634676"/>
-            <a:ext cx="12115800" cy="3631763"/>
+            <a:off x="16167868" y="38045072"/>
+            <a:ext cx="12115800" cy="3877985"/>
           </a:xfrm>
           <a:prstGeom prst="rect">
             <a:avLst/>
@@ -6056,11 +6138,27 @@
                 <a:ea typeface="Avenir Next" charset="0"/>
                 <a:cs typeface="Avenir Next" charset="0"/>
               </a:rPr>
-              <a:t>Prof. Dr. Ir. Tom Schrijvers</a:t>
+              <a:t>Prof. Dr. Ir. Tom </a:t>
+            </a:r>
+            <a:r>
+              <a:rPr lang="nl-NL" sz="3200" dirty="0" smtClean="0">
+                <a:latin typeface="Avenir Next" charset="0"/>
+                <a:ea typeface="Avenir Next" charset="0"/>
+                <a:cs typeface="Avenir Next" charset="0"/>
+              </a:rPr>
+              <a:t>Schrijvers</a:t>
             </a:r>
           </a:p>
           <a:p>
             <a:pPr algn="just"/>
+            <a:endParaRPr lang="nl-NL" sz="1400" dirty="0" smtClean="0">
+              <a:latin typeface="Avenir Next" charset="0"/>
+              <a:ea typeface="Avenir Next" charset="0"/>
+              <a:cs typeface="Avenir Next" charset="0"/>
+            </a:endParaRPr>
+          </a:p>
+          <a:p>
+            <a:pPr algn="just"/>
             <a:r>
               <a:rPr lang="nl-NL" sz="3200" dirty="0">
                 <a:latin typeface="Avenir Next" charset="0"/>
@@ -6092,15 +6190,15 @@
               <a:t>het </a:t>
             </a:r>
             <a:r>
-              <a:rPr lang="nl-NL" sz="3200" dirty="0">
-                <a:latin typeface="Avenir Next" charset="0"/>
-                <a:ea typeface="Avenir Next" charset="0"/>
-                <a:cs typeface="Avenir Next" charset="0"/>
-              </a:rPr>
-              <a:t>VSC (Vlaams </a:t>
-            </a:r>
-            <a:r>
-              <a:rPr lang="nl-NL" sz="3200" dirty="0" smtClean="0">
+              <a:rPr lang="nl-NL" sz="3200" i="1" dirty="0" smtClean="0">
+                <a:latin typeface="Avenir Next" charset="0"/>
+                <a:ea typeface="Avenir Next" charset="0"/>
+                <a:cs typeface="Avenir Next" charset="0"/>
+              </a:rPr>
+              <a:t>Vlaams </a:t>
+            </a:r>
+            <a:r>
+              <a:rPr lang="nl-NL" sz="3200" i="1" dirty="0" smtClean="0">
                 <a:latin typeface="Avenir Next" charset="0"/>
                 <a:ea typeface="Avenir Next" charset="0"/>
                 <a:cs typeface="Avenir Next" charset="0"/>
@@ -6111,14 +6209,14 @@
           <a:p>
             <a:pPr algn="just"/>
             <a:r>
-              <a:rPr lang="nl-NL" sz="3200" dirty="0" smtClean="0">
-                <a:latin typeface="Avenir Next" charset="0"/>
-                <a:ea typeface="Avenir Next" charset="0"/>
-                <a:cs typeface="Avenir Next" charset="0"/>
-              </a:rPr>
-              <a:t>Centrum)</a:t>
-            </a:r>
-            <a:endParaRPr lang="nl-NL" sz="4000" dirty="0">
+              <a:rPr lang="nl-NL" sz="3200" i="1" dirty="0" smtClean="0">
+                <a:latin typeface="Avenir Next" charset="0"/>
+                <a:ea typeface="Avenir Next" charset="0"/>
+                <a:cs typeface="Avenir Next" charset="0"/>
+              </a:rPr>
+              <a:t>Centrum</a:t>
+            </a:r>
+            <a:endParaRPr lang="nl-NL" sz="4000" i="1" dirty="0">
               <a:latin typeface="Avenir Next" charset="0"/>
               <a:ea typeface="Avenir Next" charset="0"/>
               <a:cs typeface="Avenir Next" charset="0"/>
@@ -6735,7 +6833,7 @@
         </p:blipFill>
         <p:spPr>
           <a:xfrm>
-            <a:off x="16825768" y="29425142"/>
+            <a:off x="17113949" y="25316143"/>
             <a:ext cx="10800000" cy="7054211"/>
           </a:xfrm>
           <a:prstGeom prst="rect">
@@ -6765,7 +6863,7 @@
         </p:blipFill>
         <p:spPr>
           <a:xfrm>
-            <a:off x="16825768" y="20944511"/>
+            <a:off x="17113949" y="17816696"/>
             <a:ext cx="10800000" cy="7054211"/>
           </a:xfrm>
           <a:prstGeom prst="rect">
@@ -6875,6 +6973,36 @@
           </a:fontRef>
         </p:style>
       </p:cxnSp>
+      <p:pic>
+        <p:nvPicPr>
+          <p:cNvPr id="60" name="Afbeelding 59"/>
+          <p:cNvPicPr>
+            <a:picLocks noChangeAspect="1"/>
+          </p:cNvPicPr>
+          <p:nvPr/>
+        </p:nvPicPr>
+        <p:blipFill>
+          <a:blip r:embed="rId15">
+            <a:extLst>
+              <a:ext uri="{28A0092B-C50C-407E-A947-70E740481C1C}">
+                <a14:useLocalDpi xmlns:a14="http://schemas.microsoft.com/office/drawing/2010/main" val="0"/>
+              </a:ext>
+            </a:extLst>
+          </a:blip>
+          <a:stretch>
+            <a:fillRect/>
+          </a:stretch>
+        </p:blipFill>
+        <p:spPr>
+          <a:xfrm>
+            <a:off x="17946426" y="8582276"/>
+            <a:ext cx="9815847" cy="5256000"/>
+          </a:xfrm>
+          <a:prstGeom prst="rect">
+            <a:avLst/>
+          </a:prstGeom>
+        </p:spPr>
+      </p:pic>
     </p:spTree>
   </p:cSld>
   <p:clrMapOvr>

</xml_diff>